<commit_message>
expo de la empresa asignacion de tarea y actualizacion de la expo
</commit_message>
<xml_diff>
--- a/13 Modelos de negocios/Empresa Outtic.pptx
+++ b/13 Modelos de negocios/Empresa Outtic.pptx
@@ -5,7 +5,7 @@
     <p:sldMasterId id="2147483659" r:id="rId1"/>
   </p:sldMasterIdLst>
   <p:notesMasterIdLst>
-    <p:notesMasterId r:id="rId10"/>
+    <p:notesMasterId r:id="rId13"/>
   </p:notesMasterIdLst>
   <p:sldIdLst>
     <p:sldId id="256" r:id="rId2"/>
@@ -16,42 +16,45 @@
     <p:sldId id="271" r:id="rId7"/>
     <p:sldId id="273" r:id="rId8"/>
     <p:sldId id="287" r:id="rId9"/>
+    <p:sldId id="290" r:id="rId10"/>
+    <p:sldId id="288" r:id="rId11"/>
+    <p:sldId id="291" r:id="rId12"/>
   </p:sldIdLst>
   <p:sldSz cx="9144000" cy="5143500" type="screen16x9"/>
   <p:notesSz cx="6858000" cy="9144000"/>
   <p:embeddedFontLst>
     <p:embeddedFont>
       <p:font typeface="Barlow" panose="00000500000000000000" pitchFamily="2" charset="0"/>
-      <p:regular r:id="rId11"/>
-      <p:bold r:id="rId12"/>
-      <p:italic r:id="rId13"/>
-      <p:boldItalic r:id="rId14"/>
+      <p:regular r:id="rId14"/>
+      <p:bold r:id="rId15"/>
+      <p:italic r:id="rId16"/>
+      <p:boldItalic r:id="rId17"/>
     </p:embeddedFont>
     <p:embeddedFont>
       <p:font typeface="Barlow Light" panose="00000400000000000000" pitchFamily="2" charset="0"/>
-      <p:regular r:id="rId15"/>
-      <p:bold r:id="rId16"/>
-      <p:italic r:id="rId17"/>
-      <p:boldItalic r:id="rId18"/>
+      <p:regular r:id="rId18"/>
+      <p:bold r:id="rId19"/>
+      <p:italic r:id="rId20"/>
+      <p:boldItalic r:id="rId21"/>
     </p:embeddedFont>
     <p:embeddedFont>
       <p:font typeface="Calibri" panose="020F0502020204030204" pitchFamily="34" charset="0"/>
-      <p:regular r:id="rId19"/>
-      <p:bold r:id="rId20"/>
-      <p:italic r:id="rId21"/>
-      <p:boldItalic r:id="rId22"/>
+      <p:regular r:id="rId22"/>
+      <p:bold r:id="rId23"/>
+      <p:italic r:id="rId24"/>
+      <p:boldItalic r:id="rId25"/>
     </p:embeddedFont>
     <p:embeddedFont>
       <p:font typeface="Miriam Libre" panose="00000500000000000000" pitchFamily="2" charset="-79"/>
-      <p:regular r:id="rId23"/>
-      <p:bold r:id="rId24"/>
+      <p:regular r:id="rId26"/>
+      <p:bold r:id="rId27"/>
     </p:embeddedFont>
     <p:embeddedFont>
       <p:font typeface="Work Sans" pitchFamily="2" charset="0"/>
-      <p:regular r:id="rId25"/>
-      <p:bold r:id="rId26"/>
-      <p:italic r:id="rId27"/>
-      <p:boldItalic r:id="rId28"/>
+      <p:regular r:id="rId28"/>
+      <p:bold r:id="rId29"/>
+      <p:italic r:id="rId30"/>
+      <p:boldItalic r:id="rId31"/>
     </p:embeddedFont>
   </p:embeddedFontLst>
   <p:defaultTextStyle>
@@ -283,6 +286,11 @@
       </a:defRPr>
     </a:lvl9pPr>
   </p:defaultTextStyle>
+  <p:extLst>
+    <p:ext uri="{EFAFB233-063F-42B5-8137-9DF3F51BA10A}">
+      <p15:sldGuideLst xmlns:p15="http://schemas.microsoft.com/office/powerpoint/2012/main"/>
+    </p:ext>
+  </p:extLst>
 </p:presentation>
 </file>
 
@@ -831,6 +839,224 @@
 </p:notes>
 </file>
 
+<file path=ppt/notesSlides/notesSlide10.xml><?xml version="1.0" encoding="utf-8"?>
+<p:notes xmlns:a="http://schemas.openxmlformats.org/drawingml/2006/main" xmlns:r="http://schemas.openxmlformats.org/officeDocument/2006/relationships" xmlns:p="http://schemas.openxmlformats.org/presentationml/2006/main" showMasterSp="0" showMasterPhAnim="0">
+  <p:cSld>
+    <p:spTree>
+      <p:nvGrpSpPr>
+        <p:cNvPr id="1" name="Shape 406"/>
+        <p:cNvGrpSpPr/>
+        <p:nvPr/>
+      </p:nvGrpSpPr>
+      <p:grpSpPr>
+        <a:xfrm>
+          <a:off x="0" y="0"/>
+          <a:ext cx="0" cy="0"/>
+          <a:chOff x="0" y="0"/>
+          <a:chExt cx="0" cy="0"/>
+        </a:xfrm>
+      </p:grpSpPr>
+      <p:sp>
+        <p:nvSpPr>
+          <p:cNvPr id="407" name="Google Shape;407;g35ed75ccf_057:notes"/>
+          <p:cNvSpPr>
+            <a:spLocks noGrp="1" noRot="1" noChangeAspect="1"/>
+          </p:cNvSpPr>
+          <p:nvPr>
+            <p:ph type="sldImg" idx="2"/>
+          </p:nvPr>
+        </p:nvSpPr>
+        <p:spPr>
+          <a:xfrm>
+            <a:off x="381000" y="685800"/>
+            <a:ext cx="6096000" cy="3429000"/>
+          </a:xfrm>
+          <a:custGeom>
+            <a:avLst/>
+            <a:gdLst/>
+            <a:ahLst/>
+            <a:cxnLst/>
+            <a:rect l="l" t="t" r="r" b="b"/>
+            <a:pathLst>
+              <a:path w="120000" h="120000" extrusionOk="0">
+                <a:moveTo>
+                  <a:pt x="0" y="0"/>
+                </a:moveTo>
+                <a:lnTo>
+                  <a:pt x="120000" y="0"/>
+                </a:lnTo>
+                <a:lnTo>
+                  <a:pt x="120000" y="120000"/>
+                </a:lnTo>
+                <a:lnTo>
+                  <a:pt x="0" y="120000"/>
+                </a:lnTo>
+                <a:close/>
+              </a:path>
+            </a:pathLst>
+          </a:custGeom>
+        </p:spPr>
+      </p:sp>
+      <p:sp>
+        <p:nvSpPr>
+          <p:cNvPr id="408" name="Google Shape;408;g35ed75ccf_057:notes"/>
+          <p:cNvSpPr txBox="1">
+            <a:spLocks noGrp="1"/>
+          </p:cNvSpPr>
+          <p:nvPr>
+            <p:ph type="body" idx="1"/>
+          </p:nvPr>
+        </p:nvSpPr>
+        <p:spPr>
+          <a:xfrm>
+            <a:off x="685800" y="4343400"/>
+            <a:ext cx="5486400" cy="4114800"/>
+          </a:xfrm>
+          <a:prstGeom prst="rect">
+            <a:avLst/>
+          </a:prstGeom>
+        </p:spPr>
+        <p:txBody>
+          <a:bodyPr spcFirstLastPara="1" wrap="square" lIns="91425" tIns="91425" rIns="91425" bIns="91425" anchor="t" anchorCtr="0">
+            <a:noAutofit/>
+          </a:bodyPr>
+          <a:lstStyle/>
+          <a:p>
+            <a:pPr marL="0" lvl="0" indent="0" algn="l" rtl="0">
+              <a:spcBef>
+                <a:spcPts val="0"/>
+              </a:spcBef>
+              <a:spcAft>
+                <a:spcPts val="0"/>
+              </a:spcAft>
+              <a:buNone/>
+            </a:pPr>
+            <a:endParaRPr dirty="0"/>
+          </a:p>
+        </p:txBody>
+      </p:sp>
+    </p:spTree>
+    <p:extLst>
+      <p:ext uri="{BB962C8B-B14F-4D97-AF65-F5344CB8AC3E}">
+        <p14:creationId xmlns:p14="http://schemas.microsoft.com/office/powerpoint/2010/main" val="3303113062"/>
+      </p:ext>
+    </p:extLst>
+  </p:cSld>
+  <p:clrMapOvr>
+    <a:masterClrMapping/>
+  </p:clrMapOvr>
+</p:notes>
+</file>
+
+<file path=ppt/notesSlides/notesSlide11.xml><?xml version="1.0" encoding="utf-8"?>
+<p:notes xmlns:a="http://schemas.openxmlformats.org/drawingml/2006/main" xmlns:r="http://schemas.openxmlformats.org/officeDocument/2006/relationships" xmlns:p="http://schemas.openxmlformats.org/presentationml/2006/main" showMasterSp="0" showMasterPhAnim="0">
+  <p:cSld>
+    <p:spTree>
+      <p:nvGrpSpPr>
+        <p:cNvPr id="1" name="Shape 270"/>
+        <p:cNvGrpSpPr/>
+        <p:nvPr/>
+      </p:nvGrpSpPr>
+      <p:grpSpPr>
+        <a:xfrm>
+          <a:off x="0" y="0"/>
+          <a:ext cx="0" cy="0"/>
+          <a:chOff x="0" y="0"/>
+          <a:chExt cx="0" cy="0"/>
+        </a:xfrm>
+      </p:grpSpPr>
+      <p:sp>
+        <p:nvSpPr>
+          <p:cNvPr id="271" name="Google Shape;271;g35f391192_09:notes"/>
+          <p:cNvSpPr>
+            <a:spLocks noGrp="1" noRot="1" noChangeAspect="1"/>
+          </p:cNvSpPr>
+          <p:nvPr>
+            <p:ph type="sldImg" idx="2"/>
+          </p:nvPr>
+        </p:nvSpPr>
+        <p:spPr>
+          <a:xfrm>
+            <a:off x="381000" y="685800"/>
+            <a:ext cx="6096000" cy="3429000"/>
+          </a:xfrm>
+          <a:custGeom>
+            <a:avLst/>
+            <a:gdLst/>
+            <a:ahLst/>
+            <a:cxnLst/>
+            <a:rect l="l" t="t" r="r" b="b"/>
+            <a:pathLst>
+              <a:path w="120000" h="120000" extrusionOk="0">
+                <a:moveTo>
+                  <a:pt x="0" y="0"/>
+                </a:moveTo>
+                <a:lnTo>
+                  <a:pt x="120000" y="0"/>
+                </a:lnTo>
+                <a:lnTo>
+                  <a:pt x="120000" y="120000"/>
+                </a:lnTo>
+                <a:lnTo>
+                  <a:pt x="0" y="120000"/>
+                </a:lnTo>
+                <a:close/>
+              </a:path>
+            </a:pathLst>
+          </a:custGeom>
+        </p:spPr>
+      </p:sp>
+      <p:sp>
+        <p:nvSpPr>
+          <p:cNvPr id="272" name="Google Shape;272;g35f391192_09:notes"/>
+          <p:cNvSpPr txBox="1">
+            <a:spLocks noGrp="1"/>
+          </p:cNvSpPr>
+          <p:nvPr>
+            <p:ph type="body" idx="1"/>
+          </p:nvPr>
+        </p:nvSpPr>
+        <p:spPr>
+          <a:xfrm>
+            <a:off x="685800" y="4343400"/>
+            <a:ext cx="5486400" cy="4114800"/>
+          </a:xfrm>
+          <a:prstGeom prst="rect">
+            <a:avLst/>
+          </a:prstGeom>
+        </p:spPr>
+        <p:txBody>
+          <a:bodyPr spcFirstLastPara="1" wrap="square" lIns="91425" tIns="91425" rIns="91425" bIns="91425" anchor="t" anchorCtr="0">
+            <a:noAutofit/>
+          </a:bodyPr>
+          <a:lstStyle/>
+          <a:p>
+            <a:pPr marL="0" lvl="0" indent="0" algn="l" rtl="0">
+              <a:spcBef>
+                <a:spcPts val="0"/>
+              </a:spcBef>
+              <a:spcAft>
+                <a:spcPts val="0"/>
+              </a:spcAft>
+              <a:buNone/>
+            </a:pPr>
+            <a:endParaRPr/>
+          </a:p>
+        </p:txBody>
+      </p:sp>
+    </p:spTree>
+    <p:extLst>
+      <p:ext uri="{BB962C8B-B14F-4D97-AF65-F5344CB8AC3E}">
+        <p14:creationId xmlns:p14="http://schemas.microsoft.com/office/powerpoint/2010/main" val="3779669734"/>
+      </p:ext>
+    </p:extLst>
+  </p:cSld>
+  <p:clrMapOvr>
+    <a:masterClrMapping/>
+  </p:clrMapOvr>
+</p:notes>
+</file>
+
 <file path=ppt/notesSlides/notesSlide2.xml><?xml version="1.0" encoding="utf-8"?>
 <p:notes xmlns:a="http://schemas.openxmlformats.org/drawingml/2006/main" xmlns:r="http://schemas.openxmlformats.org/officeDocument/2006/relationships" xmlns:p="http://schemas.openxmlformats.org/presentationml/2006/main" showMasterSp="0" showMasterPhAnim="0">
   <p:cSld>
@@ -1552,6 +1778,115 @@
         </p:txBody>
       </p:sp>
     </p:spTree>
+  </p:cSld>
+  <p:clrMapOvr>
+    <a:masterClrMapping/>
+  </p:clrMapOvr>
+</p:notes>
+</file>
+
+<file path=ppt/notesSlides/notesSlide9.xml><?xml version="1.0" encoding="utf-8"?>
+<p:notes xmlns:a="http://schemas.openxmlformats.org/drawingml/2006/main" xmlns:r="http://schemas.openxmlformats.org/officeDocument/2006/relationships" xmlns:p="http://schemas.openxmlformats.org/presentationml/2006/main" showMasterSp="0" showMasterPhAnim="0">
+  <p:cSld>
+    <p:spTree>
+      <p:nvGrpSpPr>
+        <p:cNvPr id="1" name="Shape 257"/>
+        <p:cNvGrpSpPr/>
+        <p:nvPr/>
+      </p:nvGrpSpPr>
+      <p:grpSpPr>
+        <a:xfrm>
+          <a:off x="0" y="0"/>
+          <a:ext cx="0" cy="0"/>
+          <a:chOff x="0" y="0"/>
+          <a:chExt cx="0" cy="0"/>
+        </a:xfrm>
+      </p:grpSpPr>
+      <p:sp>
+        <p:nvSpPr>
+          <p:cNvPr id="258" name="Google Shape;258;p:notes"/>
+          <p:cNvSpPr>
+            <a:spLocks noGrp="1" noRot="1" noChangeAspect="1"/>
+          </p:cNvSpPr>
+          <p:nvPr>
+            <p:ph type="sldImg" idx="2"/>
+          </p:nvPr>
+        </p:nvSpPr>
+        <p:spPr>
+          <a:xfrm>
+            <a:off x="381000" y="685800"/>
+            <a:ext cx="6096000" cy="3429000"/>
+          </a:xfrm>
+          <a:custGeom>
+            <a:avLst/>
+            <a:gdLst/>
+            <a:ahLst/>
+            <a:cxnLst/>
+            <a:rect l="l" t="t" r="r" b="b"/>
+            <a:pathLst>
+              <a:path w="120000" h="120000" extrusionOk="0">
+                <a:moveTo>
+                  <a:pt x="0" y="0"/>
+                </a:moveTo>
+                <a:lnTo>
+                  <a:pt x="120000" y="0"/>
+                </a:lnTo>
+                <a:lnTo>
+                  <a:pt x="120000" y="120000"/>
+                </a:lnTo>
+                <a:lnTo>
+                  <a:pt x="0" y="120000"/>
+                </a:lnTo>
+                <a:close/>
+              </a:path>
+            </a:pathLst>
+          </a:custGeom>
+        </p:spPr>
+      </p:sp>
+      <p:sp>
+        <p:nvSpPr>
+          <p:cNvPr id="259" name="Google Shape;259;p:notes"/>
+          <p:cNvSpPr txBox="1">
+            <a:spLocks noGrp="1"/>
+          </p:cNvSpPr>
+          <p:nvPr>
+            <p:ph type="body" idx="1"/>
+          </p:nvPr>
+        </p:nvSpPr>
+        <p:spPr>
+          <a:xfrm>
+            <a:off x="685800" y="4343400"/>
+            <a:ext cx="5486400" cy="4114800"/>
+          </a:xfrm>
+          <a:prstGeom prst="rect">
+            <a:avLst/>
+          </a:prstGeom>
+        </p:spPr>
+        <p:txBody>
+          <a:bodyPr spcFirstLastPara="1" wrap="square" lIns="91425" tIns="91425" rIns="91425" bIns="91425" anchor="t" anchorCtr="0">
+            <a:noAutofit/>
+          </a:bodyPr>
+          <a:lstStyle/>
+          <a:p>
+            <a:pPr marL="0" lvl="0" indent="0" algn="l" rtl="0">
+              <a:spcBef>
+                <a:spcPts val="0"/>
+              </a:spcBef>
+              <a:spcAft>
+                <a:spcPts val="0"/>
+              </a:spcAft>
+              <a:buNone/>
+            </a:pPr>
+            <a:endParaRPr/>
+          </a:p>
+        </p:txBody>
+      </p:sp>
+    </p:spTree>
+    <p:extLst>
+      <p:ext uri="{BB962C8B-B14F-4D97-AF65-F5344CB8AC3E}">
+        <p14:creationId xmlns:p14="http://schemas.microsoft.com/office/powerpoint/2010/main" val="4271102724"/>
+      </p:ext>
+    </p:extLst>
   </p:cSld>
   <p:clrMapOvr>
     <a:masterClrMapping/>
@@ -32673,6 +33008,1729 @@
 </p:sld>
 </file>
 
+<file path=ppt/slides/slide10.xml><?xml version="1.0" encoding="utf-8"?>
+<p:sld xmlns:a="http://schemas.openxmlformats.org/drawingml/2006/main" xmlns:r="http://schemas.openxmlformats.org/officeDocument/2006/relationships" xmlns:p="http://schemas.openxmlformats.org/presentationml/2006/main">
+  <p:cSld>
+    <p:spTree>
+      <p:nvGrpSpPr>
+        <p:cNvPr id="1" name="Shape 409"/>
+        <p:cNvGrpSpPr/>
+        <p:nvPr/>
+      </p:nvGrpSpPr>
+      <p:grpSpPr>
+        <a:xfrm>
+          <a:off x="0" y="0"/>
+          <a:ext cx="0" cy="0"/>
+          <a:chOff x="0" y="0"/>
+          <a:chExt cx="0" cy="0"/>
+        </a:xfrm>
+      </p:grpSpPr>
+      <p:sp>
+        <p:nvSpPr>
+          <p:cNvPr id="410" name="Google Shape;410;p30"/>
+          <p:cNvSpPr txBox="1">
+            <a:spLocks noGrp="1"/>
+          </p:cNvSpPr>
+          <p:nvPr>
+            <p:ph type="title"/>
+          </p:nvPr>
+        </p:nvSpPr>
+        <p:spPr>
+          <a:xfrm>
+            <a:off x="531558" y="122259"/>
+            <a:ext cx="5138700" cy="857400"/>
+          </a:xfrm>
+          <a:prstGeom prst="rect">
+            <a:avLst/>
+          </a:prstGeom>
+        </p:spPr>
+        <p:txBody>
+          <a:bodyPr spcFirstLastPara="1" wrap="square" lIns="91425" tIns="91425" rIns="91425" bIns="91425" anchor="b" anchorCtr="0">
+            <a:noAutofit/>
+          </a:bodyPr>
+          <a:lstStyle/>
+          <a:p>
+            <a:pPr marL="0" lvl="0" indent="0" algn="l" rtl="0">
+              <a:spcBef>
+                <a:spcPts val="0"/>
+              </a:spcBef>
+              <a:spcAft>
+                <a:spcPts val="0"/>
+              </a:spcAft>
+              <a:buNone/>
+            </a:pPr>
+            <a:r>
+              <a:rPr lang="es-MX" dirty="0"/>
+              <a:t>Estructura organizacional </a:t>
+            </a:r>
+          </a:p>
+        </p:txBody>
+      </p:sp>
+      <p:sp>
+        <p:nvSpPr>
+          <p:cNvPr id="414" name="Google Shape;414;p30"/>
+          <p:cNvSpPr txBox="1">
+            <a:spLocks noGrp="1"/>
+          </p:cNvSpPr>
+          <p:nvPr>
+            <p:ph type="sldNum" idx="12"/>
+          </p:nvPr>
+        </p:nvSpPr>
+        <p:spPr>
+          <a:xfrm>
+            <a:off x="8808000" y="2208175"/>
+            <a:ext cx="336000" cy="727200"/>
+          </a:xfrm>
+          <a:prstGeom prst="rect">
+            <a:avLst/>
+          </a:prstGeom>
+        </p:spPr>
+        <p:txBody>
+          <a:bodyPr spcFirstLastPara="1" wrap="square" lIns="91425" tIns="91425" rIns="91425" bIns="91425" anchor="ctr" anchorCtr="0">
+            <a:noAutofit/>
+          </a:bodyPr>
+          <a:lstStyle/>
+          <a:p>
+            <a:pPr marL="0" lvl="0" indent="0" algn="ctr" rtl="0">
+              <a:spcBef>
+                <a:spcPts val="0"/>
+              </a:spcBef>
+              <a:spcAft>
+                <a:spcPts val="0"/>
+              </a:spcAft>
+              <a:buNone/>
+            </a:pPr>
+            <a:fld id="{00000000-1234-1234-1234-123412341234}" type="slidenum">
+              <a:rPr lang="en"/>
+              <a:t>10</a:t>
+            </a:fld>
+            <a:endParaRPr dirty="0"/>
+          </a:p>
+        </p:txBody>
+      </p:sp>
+      <p:sp>
+        <p:nvSpPr>
+          <p:cNvPr id="18" name="Rectángulo 17">
+            <a:extLst>
+              <a:ext uri="{FF2B5EF4-FFF2-40B4-BE49-F238E27FC236}">
+                <a16:creationId xmlns:a16="http://schemas.microsoft.com/office/drawing/2014/main" id="{712F7BD7-C796-A451-57C6-F38A79CDF9CF}"/>
+              </a:ext>
+            </a:extLst>
+          </p:cNvPr>
+          <p:cNvSpPr/>
+          <p:nvPr/>
+        </p:nvSpPr>
+        <p:spPr>
+          <a:xfrm>
+            <a:off x="1701210" y="1303952"/>
+            <a:ext cx="808075" cy="595423"/>
+          </a:xfrm>
+          <a:prstGeom prst="rect">
+            <a:avLst/>
+          </a:prstGeom>
+        </p:spPr>
+        <p:style>
+          <a:lnRef idx="2">
+            <a:schemeClr val="accent1">
+              <a:shade val="50000"/>
+            </a:schemeClr>
+          </a:lnRef>
+          <a:fillRef idx="1">
+            <a:schemeClr val="accent1"/>
+          </a:fillRef>
+          <a:effectRef idx="0">
+            <a:schemeClr val="accent1"/>
+          </a:effectRef>
+          <a:fontRef idx="minor">
+            <a:schemeClr val="lt1"/>
+          </a:fontRef>
+        </p:style>
+        <p:txBody>
+          <a:bodyPr rtlCol="0" anchor="ctr"/>
+          <a:lstStyle/>
+          <a:p>
+            <a:pPr algn="ctr"/>
+            <a:r>
+              <a:rPr lang="es-MX" dirty="0">
+                <a:solidFill>
+                  <a:schemeClr val="tx1">
+                    <a:lumMod val="75000"/>
+                    <a:lumOff val="25000"/>
+                  </a:schemeClr>
+                </a:solidFill>
+              </a:rPr>
+              <a:t>Ceo1</a:t>
+            </a:r>
+          </a:p>
+        </p:txBody>
+      </p:sp>
+      <p:sp>
+        <p:nvSpPr>
+          <p:cNvPr id="19" name="Rectángulo 18">
+            <a:extLst>
+              <a:ext uri="{FF2B5EF4-FFF2-40B4-BE49-F238E27FC236}">
+                <a16:creationId xmlns:a16="http://schemas.microsoft.com/office/drawing/2014/main" id="{836AC573-F931-943D-09AC-DE088C3CB468}"/>
+              </a:ext>
+            </a:extLst>
+          </p:cNvPr>
+          <p:cNvSpPr/>
+          <p:nvPr/>
+        </p:nvSpPr>
+        <p:spPr>
+          <a:xfrm>
+            <a:off x="2785730" y="1303951"/>
+            <a:ext cx="808075" cy="595423"/>
+          </a:xfrm>
+          <a:prstGeom prst="rect">
+            <a:avLst/>
+          </a:prstGeom>
+        </p:spPr>
+        <p:style>
+          <a:lnRef idx="2">
+            <a:schemeClr val="accent1">
+              <a:shade val="50000"/>
+            </a:schemeClr>
+          </a:lnRef>
+          <a:fillRef idx="1">
+            <a:schemeClr val="accent1"/>
+          </a:fillRef>
+          <a:effectRef idx="0">
+            <a:schemeClr val="accent1"/>
+          </a:effectRef>
+          <a:fontRef idx="minor">
+            <a:schemeClr val="lt1"/>
+          </a:fontRef>
+        </p:style>
+        <p:txBody>
+          <a:bodyPr rtlCol="0" anchor="ctr"/>
+          <a:lstStyle/>
+          <a:p>
+            <a:pPr algn="ctr"/>
+            <a:r>
+              <a:rPr lang="es-MX" dirty="0">
+                <a:solidFill>
+                  <a:schemeClr val="tx1">
+                    <a:lumMod val="75000"/>
+                    <a:lumOff val="25000"/>
+                  </a:schemeClr>
+                </a:solidFill>
+              </a:rPr>
+              <a:t>Ceo2</a:t>
+            </a:r>
+          </a:p>
+        </p:txBody>
+      </p:sp>
+      <p:sp>
+        <p:nvSpPr>
+          <p:cNvPr id="20" name="Rectángulo 19">
+            <a:extLst>
+              <a:ext uri="{FF2B5EF4-FFF2-40B4-BE49-F238E27FC236}">
+                <a16:creationId xmlns:a16="http://schemas.microsoft.com/office/drawing/2014/main" id="{103B8D52-0440-3D9E-A13C-9D8FC97DDD77}"/>
+              </a:ext>
+            </a:extLst>
+          </p:cNvPr>
+          <p:cNvSpPr/>
+          <p:nvPr/>
+        </p:nvSpPr>
+        <p:spPr>
+          <a:xfrm>
+            <a:off x="3870250" y="1303951"/>
+            <a:ext cx="808075" cy="595423"/>
+          </a:xfrm>
+          <a:prstGeom prst="rect">
+            <a:avLst/>
+          </a:prstGeom>
+        </p:spPr>
+        <p:style>
+          <a:lnRef idx="2">
+            <a:schemeClr val="accent1">
+              <a:shade val="50000"/>
+            </a:schemeClr>
+          </a:lnRef>
+          <a:fillRef idx="1">
+            <a:schemeClr val="accent1"/>
+          </a:fillRef>
+          <a:effectRef idx="0">
+            <a:schemeClr val="accent1"/>
+          </a:effectRef>
+          <a:fontRef idx="minor">
+            <a:schemeClr val="lt1"/>
+          </a:fontRef>
+        </p:style>
+        <p:txBody>
+          <a:bodyPr rtlCol="0" anchor="ctr"/>
+          <a:lstStyle/>
+          <a:p>
+            <a:pPr algn="ctr"/>
+            <a:r>
+              <a:rPr lang="es-MX" dirty="0">
+                <a:solidFill>
+                  <a:schemeClr val="tx1">
+                    <a:lumMod val="75000"/>
+                    <a:lumOff val="25000"/>
+                  </a:schemeClr>
+                </a:solidFill>
+              </a:rPr>
+              <a:t>Ceo3</a:t>
+            </a:r>
+          </a:p>
+        </p:txBody>
+      </p:sp>
+      <p:sp>
+        <p:nvSpPr>
+          <p:cNvPr id="21" name="Rectángulo 20">
+            <a:extLst>
+              <a:ext uri="{FF2B5EF4-FFF2-40B4-BE49-F238E27FC236}">
+                <a16:creationId xmlns:a16="http://schemas.microsoft.com/office/drawing/2014/main" id="{91351F5C-5134-4A6B-110D-4EF336B3AE30}"/>
+              </a:ext>
+            </a:extLst>
+          </p:cNvPr>
+          <p:cNvSpPr/>
+          <p:nvPr/>
+        </p:nvSpPr>
+        <p:spPr>
+          <a:xfrm>
+            <a:off x="1190847" y="2559788"/>
+            <a:ext cx="808075" cy="595423"/>
+          </a:xfrm>
+          <a:prstGeom prst="rect">
+            <a:avLst/>
+          </a:prstGeom>
+        </p:spPr>
+        <p:style>
+          <a:lnRef idx="2">
+            <a:schemeClr val="accent1">
+              <a:shade val="50000"/>
+            </a:schemeClr>
+          </a:lnRef>
+          <a:fillRef idx="1">
+            <a:schemeClr val="accent1"/>
+          </a:fillRef>
+          <a:effectRef idx="0">
+            <a:schemeClr val="accent1"/>
+          </a:effectRef>
+          <a:fontRef idx="minor">
+            <a:schemeClr val="lt1"/>
+          </a:fontRef>
+        </p:style>
+        <p:txBody>
+          <a:bodyPr rtlCol="0" anchor="ctr"/>
+          <a:lstStyle/>
+          <a:p>
+            <a:pPr algn="ctr"/>
+            <a:r>
+              <a:rPr lang="es-MX" sz="800" dirty="0">
+                <a:solidFill>
+                  <a:schemeClr val="tx1">
+                    <a:lumMod val="75000"/>
+                    <a:lumOff val="25000"/>
+                  </a:schemeClr>
+                </a:solidFill>
+              </a:rPr>
+              <a:t>Encargado de restauración</a:t>
+            </a:r>
+          </a:p>
+        </p:txBody>
+      </p:sp>
+      <p:sp>
+        <p:nvSpPr>
+          <p:cNvPr id="27" name="Rectángulo 26">
+            <a:extLst>
+              <a:ext uri="{FF2B5EF4-FFF2-40B4-BE49-F238E27FC236}">
+                <a16:creationId xmlns:a16="http://schemas.microsoft.com/office/drawing/2014/main" id="{07F84793-1EFD-406D-8915-BBAD92C80B81}"/>
+              </a:ext>
+            </a:extLst>
+          </p:cNvPr>
+          <p:cNvSpPr/>
+          <p:nvPr/>
+        </p:nvSpPr>
+        <p:spPr>
+          <a:xfrm>
+            <a:off x="106327" y="3697474"/>
+            <a:ext cx="808075" cy="595423"/>
+          </a:xfrm>
+          <a:prstGeom prst="rect">
+            <a:avLst/>
+          </a:prstGeom>
+        </p:spPr>
+        <p:style>
+          <a:lnRef idx="2">
+            <a:schemeClr val="accent1">
+              <a:shade val="50000"/>
+            </a:schemeClr>
+          </a:lnRef>
+          <a:fillRef idx="1">
+            <a:schemeClr val="accent1"/>
+          </a:fillRef>
+          <a:effectRef idx="0">
+            <a:schemeClr val="accent1"/>
+          </a:effectRef>
+          <a:fontRef idx="minor">
+            <a:schemeClr val="lt1"/>
+          </a:fontRef>
+        </p:style>
+        <p:txBody>
+          <a:bodyPr rtlCol="0" anchor="ctr"/>
+          <a:lstStyle/>
+          <a:p>
+            <a:pPr algn="ctr"/>
+            <a:r>
+              <a:rPr lang="es-MX" sz="1000" dirty="0">
+                <a:solidFill>
+                  <a:schemeClr val="tx1">
+                    <a:lumMod val="75000"/>
+                    <a:lumOff val="25000"/>
+                  </a:schemeClr>
+                </a:solidFill>
+              </a:rPr>
+              <a:t>Empleado</a:t>
+            </a:r>
+          </a:p>
+        </p:txBody>
+      </p:sp>
+      <p:sp>
+        <p:nvSpPr>
+          <p:cNvPr id="38" name="Rectángulo 37">
+            <a:extLst>
+              <a:ext uri="{FF2B5EF4-FFF2-40B4-BE49-F238E27FC236}">
+                <a16:creationId xmlns:a16="http://schemas.microsoft.com/office/drawing/2014/main" id="{BDF697B9-0DF6-CB69-B9C2-94124B4E02D3}"/>
+              </a:ext>
+            </a:extLst>
+          </p:cNvPr>
+          <p:cNvSpPr/>
+          <p:nvPr/>
+        </p:nvSpPr>
+        <p:spPr>
+          <a:xfrm>
+            <a:off x="1190847" y="3734687"/>
+            <a:ext cx="808075" cy="595423"/>
+          </a:xfrm>
+          <a:prstGeom prst="rect">
+            <a:avLst/>
+          </a:prstGeom>
+        </p:spPr>
+        <p:style>
+          <a:lnRef idx="2">
+            <a:schemeClr val="accent1">
+              <a:shade val="50000"/>
+            </a:schemeClr>
+          </a:lnRef>
+          <a:fillRef idx="1">
+            <a:schemeClr val="accent1"/>
+          </a:fillRef>
+          <a:effectRef idx="0">
+            <a:schemeClr val="accent1"/>
+          </a:effectRef>
+          <a:fontRef idx="minor">
+            <a:schemeClr val="lt1"/>
+          </a:fontRef>
+        </p:style>
+        <p:txBody>
+          <a:bodyPr rtlCol="0" anchor="ctr"/>
+          <a:lstStyle/>
+          <a:p>
+            <a:pPr algn="ctr"/>
+            <a:r>
+              <a:rPr lang="es-MX" sz="1000" dirty="0">
+                <a:solidFill>
+                  <a:schemeClr val="tx1">
+                    <a:lumMod val="75000"/>
+                    <a:lumOff val="25000"/>
+                  </a:schemeClr>
+                </a:solidFill>
+              </a:rPr>
+              <a:t>Empleado</a:t>
+            </a:r>
+          </a:p>
+        </p:txBody>
+      </p:sp>
+      <p:sp>
+        <p:nvSpPr>
+          <p:cNvPr id="39" name="Rectángulo 38">
+            <a:extLst>
+              <a:ext uri="{FF2B5EF4-FFF2-40B4-BE49-F238E27FC236}">
+                <a16:creationId xmlns:a16="http://schemas.microsoft.com/office/drawing/2014/main" id="{16AD5D56-21FF-427D-73C3-A102AEF5B68A}"/>
+              </a:ext>
+            </a:extLst>
+          </p:cNvPr>
+          <p:cNvSpPr/>
+          <p:nvPr/>
+        </p:nvSpPr>
+        <p:spPr>
+          <a:xfrm>
+            <a:off x="2275366" y="3734686"/>
+            <a:ext cx="808075" cy="595423"/>
+          </a:xfrm>
+          <a:prstGeom prst="rect">
+            <a:avLst/>
+          </a:prstGeom>
+        </p:spPr>
+        <p:style>
+          <a:lnRef idx="2">
+            <a:schemeClr val="accent1">
+              <a:shade val="50000"/>
+            </a:schemeClr>
+          </a:lnRef>
+          <a:fillRef idx="1">
+            <a:schemeClr val="accent1"/>
+          </a:fillRef>
+          <a:effectRef idx="0">
+            <a:schemeClr val="accent1"/>
+          </a:effectRef>
+          <a:fontRef idx="minor">
+            <a:schemeClr val="lt1"/>
+          </a:fontRef>
+        </p:style>
+        <p:txBody>
+          <a:bodyPr rtlCol="0" anchor="ctr"/>
+          <a:lstStyle/>
+          <a:p>
+            <a:pPr algn="ctr"/>
+            <a:r>
+              <a:rPr lang="es-MX" sz="1000" dirty="0">
+                <a:solidFill>
+                  <a:schemeClr val="tx1">
+                    <a:lumMod val="75000"/>
+                    <a:lumOff val="25000"/>
+                  </a:schemeClr>
+                </a:solidFill>
+              </a:rPr>
+              <a:t>Empleado</a:t>
+            </a:r>
+          </a:p>
+        </p:txBody>
+      </p:sp>
+      <p:sp>
+        <p:nvSpPr>
+          <p:cNvPr id="40" name="Rectángulo 39">
+            <a:extLst>
+              <a:ext uri="{FF2B5EF4-FFF2-40B4-BE49-F238E27FC236}">
+                <a16:creationId xmlns:a16="http://schemas.microsoft.com/office/drawing/2014/main" id="{92883D08-DDEC-D479-59B3-86F6A896ABC2}"/>
+              </a:ext>
+            </a:extLst>
+          </p:cNvPr>
+          <p:cNvSpPr/>
+          <p:nvPr/>
+        </p:nvSpPr>
+        <p:spPr>
+          <a:xfrm>
+            <a:off x="3359888" y="3737343"/>
+            <a:ext cx="808075" cy="595423"/>
+          </a:xfrm>
+          <a:prstGeom prst="rect">
+            <a:avLst/>
+          </a:prstGeom>
+        </p:spPr>
+        <p:style>
+          <a:lnRef idx="2">
+            <a:schemeClr val="accent1">
+              <a:shade val="50000"/>
+            </a:schemeClr>
+          </a:lnRef>
+          <a:fillRef idx="1">
+            <a:schemeClr val="accent1"/>
+          </a:fillRef>
+          <a:effectRef idx="0">
+            <a:schemeClr val="accent1"/>
+          </a:effectRef>
+          <a:fontRef idx="minor">
+            <a:schemeClr val="lt1"/>
+          </a:fontRef>
+        </p:style>
+        <p:txBody>
+          <a:bodyPr rtlCol="0" anchor="ctr"/>
+          <a:lstStyle/>
+          <a:p>
+            <a:pPr algn="ctr"/>
+            <a:r>
+              <a:rPr lang="es-MX" sz="1000" dirty="0">
+                <a:solidFill>
+                  <a:schemeClr val="tx1">
+                    <a:lumMod val="75000"/>
+                    <a:lumOff val="25000"/>
+                  </a:schemeClr>
+                </a:solidFill>
+              </a:rPr>
+              <a:t>Empleado</a:t>
+            </a:r>
+          </a:p>
+        </p:txBody>
+      </p:sp>
+      <p:sp>
+        <p:nvSpPr>
+          <p:cNvPr id="41" name="Rectángulo 40">
+            <a:extLst>
+              <a:ext uri="{FF2B5EF4-FFF2-40B4-BE49-F238E27FC236}">
+                <a16:creationId xmlns:a16="http://schemas.microsoft.com/office/drawing/2014/main" id="{9C5F6D30-4DB1-17FA-ED40-7EC9625B9169}"/>
+              </a:ext>
+            </a:extLst>
+          </p:cNvPr>
+          <p:cNvSpPr/>
+          <p:nvPr/>
+        </p:nvSpPr>
+        <p:spPr>
+          <a:xfrm>
+            <a:off x="4444408" y="3774556"/>
+            <a:ext cx="808075" cy="595423"/>
+          </a:xfrm>
+          <a:prstGeom prst="rect">
+            <a:avLst/>
+          </a:prstGeom>
+        </p:spPr>
+        <p:style>
+          <a:lnRef idx="2">
+            <a:schemeClr val="accent1">
+              <a:shade val="50000"/>
+            </a:schemeClr>
+          </a:lnRef>
+          <a:fillRef idx="1">
+            <a:schemeClr val="accent1"/>
+          </a:fillRef>
+          <a:effectRef idx="0">
+            <a:schemeClr val="accent1"/>
+          </a:effectRef>
+          <a:fontRef idx="minor">
+            <a:schemeClr val="lt1"/>
+          </a:fontRef>
+        </p:style>
+        <p:txBody>
+          <a:bodyPr rtlCol="0" anchor="ctr"/>
+          <a:lstStyle/>
+          <a:p>
+            <a:pPr algn="ctr"/>
+            <a:r>
+              <a:rPr lang="es-MX" sz="1000" dirty="0">
+                <a:solidFill>
+                  <a:schemeClr val="tx1">
+                    <a:lumMod val="75000"/>
+                    <a:lumOff val="25000"/>
+                  </a:schemeClr>
+                </a:solidFill>
+              </a:rPr>
+              <a:t>Empleado</a:t>
+            </a:r>
+          </a:p>
+        </p:txBody>
+      </p:sp>
+      <p:sp>
+        <p:nvSpPr>
+          <p:cNvPr id="42" name="Rectángulo 41">
+            <a:extLst>
+              <a:ext uri="{FF2B5EF4-FFF2-40B4-BE49-F238E27FC236}">
+                <a16:creationId xmlns:a16="http://schemas.microsoft.com/office/drawing/2014/main" id="{703E4584-A359-B913-DF14-9C563C00F4B6}"/>
+              </a:ext>
+            </a:extLst>
+          </p:cNvPr>
+          <p:cNvSpPr/>
+          <p:nvPr/>
+        </p:nvSpPr>
+        <p:spPr>
+          <a:xfrm>
+            <a:off x="5528927" y="3774555"/>
+            <a:ext cx="808075" cy="595423"/>
+          </a:xfrm>
+          <a:prstGeom prst="rect">
+            <a:avLst/>
+          </a:prstGeom>
+        </p:spPr>
+        <p:style>
+          <a:lnRef idx="2">
+            <a:schemeClr val="accent1">
+              <a:shade val="50000"/>
+            </a:schemeClr>
+          </a:lnRef>
+          <a:fillRef idx="1">
+            <a:schemeClr val="accent1"/>
+          </a:fillRef>
+          <a:effectRef idx="0">
+            <a:schemeClr val="accent1"/>
+          </a:effectRef>
+          <a:fontRef idx="minor">
+            <a:schemeClr val="lt1"/>
+          </a:fontRef>
+        </p:style>
+        <p:txBody>
+          <a:bodyPr rtlCol="0" anchor="ctr"/>
+          <a:lstStyle/>
+          <a:p>
+            <a:pPr algn="ctr"/>
+            <a:r>
+              <a:rPr lang="es-MX" sz="1000" dirty="0">
+                <a:solidFill>
+                  <a:schemeClr val="tx1">
+                    <a:lumMod val="75000"/>
+                    <a:lumOff val="25000"/>
+                  </a:schemeClr>
+                </a:solidFill>
+              </a:rPr>
+              <a:t>Empleado</a:t>
+            </a:r>
+          </a:p>
+        </p:txBody>
+      </p:sp>
+      <p:sp>
+        <p:nvSpPr>
+          <p:cNvPr id="43" name="Rectángulo 42">
+            <a:extLst>
+              <a:ext uri="{FF2B5EF4-FFF2-40B4-BE49-F238E27FC236}">
+                <a16:creationId xmlns:a16="http://schemas.microsoft.com/office/drawing/2014/main" id="{EF887EA8-D946-1724-5DFA-3F1DCC64E317}"/>
+              </a:ext>
+            </a:extLst>
+          </p:cNvPr>
+          <p:cNvSpPr/>
+          <p:nvPr/>
+        </p:nvSpPr>
+        <p:spPr>
+          <a:xfrm>
+            <a:off x="72232" y="2557129"/>
+            <a:ext cx="882574" cy="595423"/>
+          </a:xfrm>
+          <a:prstGeom prst="rect">
+            <a:avLst/>
+          </a:prstGeom>
+        </p:spPr>
+        <p:style>
+          <a:lnRef idx="2">
+            <a:schemeClr val="accent1">
+              <a:shade val="50000"/>
+            </a:schemeClr>
+          </a:lnRef>
+          <a:fillRef idx="1">
+            <a:schemeClr val="accent1"/>
+          </a:fillRef>
+          <a:effectRef idx="0">
+            <a:schemeClr val="accent1"/>
+          </a:effectRef>
+          <a:fontRef idx="minor">
+            <a:schemeClr val="lt1"/>
+          </a:fontRef>
+        </p:style>
+        <p:txBody>
+          <a:bodyPr rtlCol="0" anchor="ctr"/>
+          <a:lstStyle/>
+          <a:p>
+            <a:pPr algn="ctr"/>
+            <a:r>
+              <a:rPr lang="es-MX" sz="800" dirty="0">
+                <a:solidFill>
+                  <a:schemeClr val="tx1">
+                    <a:lumMod val="75000"/>
+                    <a:lumOff val="25000"/>
+                  </a:schemeClr>
+                </a:solidFill>
+              </a:rPr>
+              <a:t>Encargado de reconstrucción</a:t>
+            </a:r>
+          </a:p>
+        </p:txBody>
+      </p:sp>
+      <p:sp>
+        <p:nvSpPr>
+          <p:cNvPr id="44" name="Rectángulo 43">
+            <a:extLst>
+              <a:ext uri="{FF2B5EF4-FFF2-40B4-BE49-F238E27FC236}">
+                <a16:creationId xmlns:a16="http://schemas.microsoft.com/office/drawing/2014/main" id="{8D3FE9D4-56E9-6AFA-134F-B52376929379}"/>
+              </a:ext>
+            </a:extLst>
+          </p:cNvPr>
+          <p:cNvSpPr/>
+          <p:nvPr/>
+        </p:nvSpPr>
+        <p:spPr>
+          <a:xfrm>
+            <a:off x="2275365" y="2559788"/>
+            <a:ext cx="808075" cy="595423"/>
+          </a:xfrm>
+          <a:prstGeom prst="rect">
+            <a:avLst/>
+          </a:prstGeom>
+        </p:spPr>
+        <p:style>
+          <a:lnRef idx="2">
+            <a:schemeClr val="accent1">
+              <a:shade val="50000"/>
+            </a:schemeClr>
+          </a:lnRef>
+          <a:fillRef idx="1">
+            <a:schemeClr val="accent1"/>
+          </a:fillRef>
+          <a:effectRef idx="0">
+            <a:schemeClr val="accent1"/>
+          </a:effectRef>
+          <a:fontRef idx="minor">
+            <a:schemeClr val="lt1"/>
+          </a:fontRef>
+        </p:style>
+        <p:txBody>
+          <a:bodyPr rtlCol="0" anchor="ctr"/>
+          <a:lstStyle/>
+          <a:p>
+            <a:pPr algn="ctr"/>
+            <a:r>
+              <a:rPr lang="es-MX" sz="800" dirty="0">
+                <a:solidFill>
+                  <a:schemeClr val="tx1">
+                    <a:lumMod val="75000"/>
+                    <a:lumOff val="25000"/>
+                  </a:schemeClr>
+                </a:solidFill>
+              </a:rPr>
+              <a:t>Encargado de mejoras</a:t>
+            </a:r>
+          </a:p>
+        </p:txBody>
+      </p:sp>
+      <p:sp>
+        <p:nvSpPr>
+          <p:cNvPr id="45" name="Rectángulo 44">
+            <a:extLst>
+              <a:ext uri="{FF2B5EF4-FFF2-40B4-BE49-F238E27FC236}">
+                <a16:creationId xmlns:a16="http://schemas.microsoft.com/office/drawing/2014/main" id="{AC872631-5A37-AB7A-8D2D-434B47B68F77}"/>
+              </a:ext>
+            </a:extLst>
+          </p:cNvPr>
+          <p:cNvSpPr/>
+          <p:nvPr/>
+        </p:nvSpPr>
+        <p:spPr>
+          <a:xfrm>
+            <a:off x="3359883" y="2578395"/>
+            <a:ext cx="808075" cy="595423"/>
+          </a:xfrm>
+          <a:prstGeom prst="rect">
+            <a:avLst/>
+          </a:prstGeom>
+        </p:spPr>
+        <p:style>
+          <a:lnRef idx="2">
+            <a:schemeClr val="accent1">
+              <a:shade val="50000"/>
+            </a:schemeClr>
+          </a:lnRef>
+          <a:fillRef idx="1">
+            <a:schemeClr val="accent1"/>
+          </a:fillRef>
+          <a:effectRef idx="0">
+            <a:schemeClr val="accent1"/>
+          </a:effectRef>
+          <a:fontRef idx="minor">
+            <a:schemeClr val="lt1"/>
+          </a:fontRef>
+        </p:style>
+        <p:txBody>
+          <a:bodyPr rtlCol="0" anchor="ctr"/>
+          <a:lstStyle/>
+          <a:p>
+            <a:pPr algn="ctr"/>
+            <a:r>
+              <a:rPr lang="es-MX" sz="800" dirty="0">
+                <a:solidFill>
+                  <a:schemeClr val="tx1">
+                    <a:lumMod val="75000"/>
+                    <a:lumOff val="25000"/>
+                  </a:schemeClr>
+                </a:solidFill>
+              </a:rPr>
+              <a:t>Encargado de actualización</a:t>
+            </a:r>
+          </a:p>
+        </p:txBody>
+      </p:sp>
+      <p:sp>
+        <p:nvSpPr>
+          <p:cNvPr id="46" name="Rectángulo 45">
+            <a:extLst>
+              <a:ext uri="{FF2B5EF4-FFF2-40B4-BE49-F238E27FC236}">
+                <a16:creationId xmlns:a16="http://schemas.microsoft.com/office/drawing/2014/main" id="{8D89BE8F-BAE0-829F-46E3-727A96F6364D}"/>
+              </a:ext>
+            </a:extLst>
+          </p:cNvPr>
+          <p:cNvSpPr/>
+          <p:nvPr/>
+        </p:nvSpPr>
+        <p:spPr>
+          <a:xfrm>
+            <a:off x="4457164" y="2567762"/>
+            <a:ext cx="808075" cy="595423"/>
+          </a:xfrm>
+          <a:prstGeom prst="rect">
+            <a:avLst/>
+          </a:prstGeom>
+        </p:spPr>
+        <p:style>
+          <a:lnRef idx="2">
+            <a:schemeClr val="accent1">
+              <a:shade val="50000"/>
+            </a:schemeClr>
+          </a:lnRef>
+          <a:fillRef idx="1">
+            <a:schemeClr val="accent1"/>
+          </a:fillRef>
+          <a:effectRef idx="0">
+            <a:schemeClr val="accent1"/>
+          </a:effectRef>
+          <a:fontRef idx="minor">
+            <a:schemeClr val="lt1"/>
+          </a:fontRef>
+        </p:style>
+        <p:txBody>
+          <a:bodyPr rtlCol="0" anchor="ctr"/>
+          <a:lstStyle/>
+          <a:p>
+            <a:pPr algn="ctr"/>
+            <a:r>
+              <a:rPr lang="es-MX" sz="800" dirty="0">
+                <a:solidFill>
+                  <a:schemeClr val="tx1">
+                    <a:lumMod val="75000"/>
+                    <a:lumOff val="25000"/>
+                  </a:schemeClr>
+                </a:solidFill>
+              </a:rPr>
+              <a:t>Encargado de análisis</a:t>
+            </a:r>
+          </a:p>
+        </p:txBody>
+      </p:sp>
+      <p:sp>
+        <p:nvSpPr>
+          <p:cNvPr id="47" name="Rectángulo 46">
+            <a:extLst>
+              <a:ext uri="{FF2B5EF4-FFF2-40B4-BE49-F238E27FC236}">
+                <a16:creationId xmlns:a16="http://schemas.microsoft.com/office/drawing/2014/main" id="{6B9E87D6-008B-1377-2E4F-A6329D9A32CA}"/>
+              </a:ext>
+            </a:extLst>
+          </p:cNvPr>
+          <p:cNvSpPr/>
+          <p:nvPr/>
+        </p:nvSpPr>
+        <p:spPr>
+          <a:xfrm>
+            <a:off x="5554444" y="2573078"/>
+            <a:ext cx="882574" cy="595423"/>
+          </a:xfrm>
+          <a:prstGeom prst="rect">
+            <a:avLst/>
+          </a:prstGeom>
+        </p:spPr>
+        <p:style>
+          <a:lnRef idx="2">
+            <a:schemeClr val="accent1">
+              <a:shade val="50000"/>
+            </a:schemeClr>
+          </a:lnRef>
+          <a:fillRef idx="1">
+            <a:schemeClr val="accent1"/>
+          </a:fillRef>
+          <a:effectRef idx="0">
+            <a:schemeClr val="accent1"/>
+          </a:effectRef>
+          <a:fontRef idx="minor">
+            <a:schemeClr val="lt1"/>
+          </a:fontRef>
+        </p:style>
+        <p:txBody>
+          <a:bodyPr rtlCol="0" anchor="ctr"/>
+          <a:lstStyle/>
+          <a:p>
+            <a:pPr algn="ctr"/>
+            <a:r>
+              <a:rPr lang="es-MX" sz="800" dirty="0">
+                <a:solidFill>
+                  <a:schemeClr val="tx1">
+                    <a:lumMod val="75000"/>
+                    <a:lumOff val="25000"/>
+                  </a:schemeClr>
+                </a:solidFill>
+              </a:rPr>
+              <a:t>Encargado de “</a:t>
+            </a:r>
+            <a:r>
+              <a:rPr lang="es-MX" sz="800" dirty="0" err="1">
+                <a:solidFill>
+                  <a:schemeClr val="tx1">
+                    <a:lumMod val="75000"/>
+                    <a:lumOff val="25000"/>
+                  </a:schemeClr>
+                </a:solidFill>
+              </a:rPr>
+              <a:t>CodeMyCode</a:t>
+            </a:r>
+            <a:r>
+              <a:rPr lang="es-MX" sz="800" dirty="0">
+                <a:solidFill>
+                  <a:schemeClr val="tx1">
+                    <a:lumMod val="75000"/>
+                    <a:lumOff val="25000"/>
+                  </a:schemeClr>
+                </a:solidFill>
+              </a:rPr>
+              <a:t>”</a:t>
+            </a:r>
+          </a:p>
+        </p:txBody>
+      </p:sp>
+      <p:cxnSp>
+        <p:nvCxnSpPr>
+          <p:cNvPr id="51" name="Conector recto 50">
+            <a:extLst>
+              <a:ext uri="{FF2B5EF4-FFF2-40B4-BE49-F238E27FC236}">
+                <a16:creationId xmlns:a16="http://schemas.microsoft.com/office/drawing/2014/main" id="{C44F6EBE-7666-77B5-5ED3-9EC2DBAD216C}"/>
+              </a:ext>
+            </a:extLst>
+          </p:cNvPr>
+          <p:cNvCxnSpPr>
+            <a:cxnSpLocks/>
+          </p:cNvCxnSpPr>
+          <p:nvPr/>
+        </p:nvCxnSpPr>
+        <p:spPr>
+          <a:xfrm>
+            <a:off x="531558" y="2208175"/>
+            <a:ext cx="5465205" cy="0"/>
+          </a:xfrm>
+          <a:prstGeom prst="line">
+            <a:avLst/>
+          </a:prstGeom>
+        </p:spPr>
+        <p:style>
+          <a:lnRef idx="1">
+            <a:schemeClr val="accent1"/>
+          </a:lnRef>
+          <a:fillRef idx="0">
+            <a:schemeClr val="accent1"/>
+          </a:fillRef>
+          <a:effectRef idx="0">
+            <a:schemeClr val="accent1"/>
+          </a:effectRef>
+          <a:fontRef idx="minor">
+            <a:schemeClr val="tx1"/>
+          </a:fontRef>
+        </p:style>
+      </p:cxnSp>
+      <p:cxnSp>
+        <p:nvCxnSpPr>
+          <p:cNvPr id="58" name="Conector recto de flecha 57">
+            <a:extLst>
+              <a:ext uri="{FF2B5EF4-FFF2-40B4-BE49-F238E27FC236}">
+                <a16:creationId xmlns:a16="http://schemas.microsoft.com/office/drawing/2014/main" id="{F0FFA62A-3811-B5AE-5CF1-06D8E3A657A2}"/>
+              </a:ext>
+            </a:extLst>
+          </p:cNvPr>
+          <p:cNvCxnSpPr>
+            <a:stCxn id="43" idx="2"/>
+            <a:endCxn id="27" idx="0"/>
+          </p:cNvCxnSpPr>
+          <p:nvPr/>
+        </p:nvCxnSpPr>
+        <p:spPr>
+          <a:xfrm flipH="1">
+            <a:off x="510365" y="3152552"/>
+            <a:ext cx="3154" cy="544922"/>
+          </a:xfrm>
+          <a:prstGeom prst="straightConnector1">
+            <a:avLst/>
+          </a:prstGeom>
+          <a:ln>
+            <a:tailEnd type="triangle"/>
+          </a:ln>
+        </p:spPr>
+        <p:style>
+          <a:lnRef idx="1">
+            <a:schemeClr val="accent1"/>
+          </a:lnRef>
+          <a:fillRef idx="0">
+            <a:schemeClr val="accent1"/>
+          </a:fillRef>
+          <a:effectRef idx="0">
+            <a:schemeClr val="accent1"/>
+          </a:effectRef>
+          <a:fontRef idx="minor">
+            <a:schemeClr val="tx1"/>
+          </a:fontRef>
+        </p:style>
+      </p:cxnSp>
+      <p:cxnSp>
+        <p:nvCxnSpPr>
+          <p:cNvPr id="59" name="Conector recto de flecha 58">
+            <a:extLst>
+              <a:ext uri="{FF2B5EF4-FFF2-40B4-BE49-F238E27FC236}">
+                <a16:creationId xmlns:a16="http://schemas.microsoft.com/office/drawing/2014/main" id="{1655A78F-2C7A-B326-4567-17EAD15CAAE3}"/>
+              </a:ext>
+            </a:extLst>
+          </p:cNvPr>
+          <p:cNvCxnSpPr/>
+          <p:nvPr/>
+        </p:nvCxnSpPr>
+        <p:spPr>
+          <a:xfrm flipH="1">
+            <a:off x="1587478" y="3164231"/>
+            <a:ext cx="3154" cy="544922"/>
+          </a:xfrm>
+          <a:prstGeom prst="straightConnector1">
+            <a:avLst/>
+          </a:prstGeom>
+          <a:ln>
+            <a:tailEnd type="triangle"/>
+          </a:ln>
+        </p:spPr>
+        <p:style>
+          <a:lnRef idx="1">
+            <a:schemeClr val="accent1"/>
+          </a:lnRef>
+          <a:fillRef idx="0">
+            <a:schemeClr val="accent1"/>
+          </a:fillRef>
+          <a:effectRef idx="0">
+            <a:schemeClr val="accent1"/>
+          </a:effectRef>
+          <a:fontRef idx="minor">
+            <a:schemeClr val="tx1"/>
+          </a:fontRef>
+        </p:style>
+      </p:cxnSp>
+      <p:cxnSp>
+        <p:nvCxnSpPr>
+          <p:cNvPr id="60" name="Conector recto de flecha 59">
+            <a:extLst>
+              <a:ext uri="{FF2B5EF4-FFF2-40B4-BE49-F238E27FC236}">
+                <a16:creationId xmlns:a16="http://schemas.microsoft.com/office/drawing/2014/main" id="{78C196E3-8FDA-E7D4-DF51-BB70B0E54A9F}"/>
+              </a:ext>
+            </a:extLst>
+          </p:cNvPr>
+          <p:cNvCxnSpPr/>
+          <p:nvPr/>
+        </p:nvCxnSpPr>
+        <p:spPr>
+          <a:xfrm flipH="1">
+            <a:off x="2693737" y="3161857"/>
+            <a:ext cx="3154" cy="544922"/>
+          </a:xfrm>
+          <a:prstGeom prst="straightConnector1">
+            <a:avLst/>
+          </a:prstGeom>
+          <a:ln>
+            <a:tailEnd type="triangle"/>
+          </a:ln>
+        </p:spPr>
+        <p:style>
+          <a:lnRef idx="1">
+            <a:schemeClr val="accent1"/>
+          </a:lnRef>
+          <a:fillRef idx="0">
+            <a:schemeClr val="accent1"/>
+          </a:fillRef>
+          <a:effectRef idx="0">
+            <a:schemeClr val="accent1"/>
+          </a:effectRef>
+          <a:fontRef idx="minor">
+            <a:schemeClr val="tx1"/>
+          </a:fontRef>
+        </p:style>
+      </p:cxnSp>
+      <p:cxnSp>
+        <p:nvCxnSpPr>
+          <p:cNvPr id="61" name="Conector recto de flecha 60">
+            <a:extLst>
+              <a:ext uri="{FF2B5EF4-FFF2-40B4-BE49-F238E27FC236}">
+                <a16:creationId xmlns:a16="http://schemas.microsoft.com/office/drawing/2014/main" id="{F5A1177E-B11E-1881-FDEF-6C4CE03CB833}"/>
+              </a:ext>
+            </a:extLst>
+          </p:cNvPr>
+          <p:cNvCxnSpPr/>
+          <p:nvPr/>
+        </p:nvCxnSpPr>
+        <p:spPr>
+          <a:xfrm flipH="1">
+            <a:off x="3770850" y="3152270"/>
+            <a:ext cx="3154" cy="544922"/>
+          </a:xfrm>
+          <a:prstGeom prst="straightConnector1">
+            <a:avLst/>
+          </a:prstGeom>
+          <a:ln>
+            <a:tailEnd type="triangle"/>
+          </a:ln>
+        </p:spPr>
+        <p:style>
+          <a:lnRef idx="1">
+            <a:schemeClr val="accent1"/>
+          </a:lnRef>
+          <a:fillRef idx="0">
+            <a:schemeClr val="accent1"/>
+          </a:fillRef>
+          <a:effectRef idx="0">
+            <a:schemeClr val="accent1"/>
+          </a:effectRef>
+          <a:fontRef idx="minor">
+            <a:schemeClr val="tx1"/>
+          </a:fontRef>
+        </p:style>
+      </p:cxnSp>
+      <p:cxnSp>
+        <p:nvCxnSpPr>
+          <p:cNvPr id="62" name="Conector recto de flecha 61">
+            <a:extLst>
+              <a:ext uri="{FF2B5EF4-FFF2-40B4-BE49-F238E27FC236}">
+                <a16:creationId xmlns:a16="http://schemas.microsoft.com/office/drawing/2014/main" id="{DD0B454B-7544-362D-FD3B-50D69D73563A}"/>
+              </a:ext>
+            </a:extLst>
+          </p:cNvPr>
+          <p:cNvCxnSpPr/>
+          <p:nvPr/>
+        </p:nvCxnSpPr>
+        <p:spPr>
+          <a:xfrm flipH="1">
+            <a:off x="4858840" y="3164199"/>
+            <a:ext cx="3154" cy="544922"/>
+          </a:xfrm>
+          <a:prstGeom prst="straightConnector1">
+            <a:avLst/>
+          </a:prstGeom>
+          <a:ln>
+            <a:tailEnd type="triangle"/>
+          </a:ln>
+        </p:spPr>
+        <p:style>
+          <a:lnRef idx="1">
+            <a:schemeClr val="accent1"/>
+          </a:lnRef>
+          <a:fillRef idx="0">
+            <a:schemeClr val="accent1"/>
+          </a:fillRef>
+          <a:effectRef idx="0">
+            <a:schemeClr val="accent1"/>
+          </a:effectRef>
+          <a:fontRef idx="minor">
+            <a:schemeClr val="tx1"/>
+          </a:fontRef>
+        </p:style>
+      </p:cxnSp>
+      <p:cxnSp>
+        <p:nvCxnSpPr>
+          <p:cNvPr id="63" name="Conector recto de flecha 62">
+            <a:extLst>
+              <a:ext uri="{FF2B5EF4-FFF2-40B4-BE49-F238E27FC236}">
+                <a16:creationId xmlns:a16="http://schemas.microsoft.com/office/drawing/2014/main" id="{0A3963BC-B549-8487-1DEA-26C9FB93EAA5}"/>
+              </a:ext>
+            </a:extLst>
+          </p:cNvPr>
+          <p:cNvCxnSpPr/>
+          <p:nvPr/>
+        </p:nvCxnSpPr>
+        <p:spPr>
+          <a:xfrm flipH="1">
+            <a:off x="5935953" y="3175878"/>
+            <a:ext cx="3154" cy="544922"/>
+          </a:xfrm>
+          <a:prstGeom prst="straightConnector1">
+            <a:avLst/>
+          </a:prstGeom>
+          <a:ln>
+            <a:tailEnd type="triangle"/>
+          </a:ln>
+        </p:spPr>
+        <p:style>
+          <a:lnRef idx="1">
+            <a:schemeClr val="accent1"/>
+          </a:lnRef>
+          <a:fillRef idx="0">
+            <a:schemeClr val="accent1"/>
+          </a:fillRef>
+          <a:effectRef idx="0">
+            <a:schemeClr val="accent1"/>
+          </a:effectRef>
+          <a:fontRef idx="minor">
+            <a:schemeClr val="tx1"/>
+          </a:fontRef>
+        </p:style>
+      </p:cxnSp>
+      <p:cxnSp>
+        <p:nvCxnSpPr>
+          <p:cNvPr id="385" name="Conector recto de flecha 384">
+            <a:extLst>
+              <a:ext uri="{FF2B5EF4-FFF2-40B4-BE49-F238E27FC236}">
+                <a16:creationId xmlns:a16="http://schemas.microsoft.com/office/drawing/2014/main" id="{0C32BD35-983A-DA06-A4F6-91DCBF8C6557}"/>
+              </a:ext>
+            </a:extLst>
+          </p:cNvPr>
+          <p:cNvCxnSpPr>
+            <a:cxnSpLocks/>
+            <a:endCxn id="43" idx="0"/>
+          </p:cNvCxnSpPr>
+          <p:nvPr/>
+        </p:nvCxnSpPr>
+        <p:spPr>
+          <a:xfrm flipH="1">
+            <a:off x="513519" y="2208175"/>
+            <a:ext cx="18039" cy="348954"/>
+          </a:xfrm>
+          <a:prstGeom prst="straightConnector1">
+            <a:avLst/>
+          </a:prstGeom>
+          <a:ln>
+            <a:tailEnd type="triangle"/>
+          </a:ln>
+        </p:spPr>
+        <p:style>
+          <a:lnRef idx="1">
+            <a:schemeClr val="accent1"/>
+          </a:lnRef>
+          <a:fillRef idx="0">
+            <a:schemeClr val="accent1"/>
+          </a:fillRef>
+          <a:effectRef idx="0">
+            <a:schemeClr val="accent1"/>
+          </a:effectRef>
+          <a:fontRef idx="minor">
+            <a:schemeClr val="tx1"/>
+          </a:fontRef>
+        </p:style>
+      </p:cxnSp>
+      <p:cxnSp>
+        <p:nvCxnSpPr>
+          <p:cNvPr id="387" name="Conector recto de flecha 386">
+            <a:extLst>
+              <a:ext uri="{FF2B5EF4-FFF2-40B4-BE49-F238E27FC236}">
+                <a16:creationId xmlns:a16="http://schemas.microsoft.com/office/drawing/2014/main" id="{F23E29FF-4463-0333-CBD4-D5DBC2EC27FF}"/>
+              </a:ext>
+            </a:extLst>
+          </p:cNvPr>
+          <p:cNvCxnSpPr>
+            <a:cxnSpLocks/>
+          </p:cNvCxnSpPr>
+          <p:nvPr/>
+        </p:nvCxnSpPr>
+        <p:spPr>
+          <a:xfrm flipH="1">
+            <a:off x="1587478" y="2208175"/>
+            <a:ext cx="18039" cy="348954"/>
+          </a:xfrm>
+          <a:prstGeom prst="straightConnector1">
+            <a:avLst/>
+          </a:prstGeom>
+          <a:ln>
+            <a:tailEnd type="triangle"/>
+          </a:ln>
+        </p:spPr>
+        <p:style>
+          <a:lnRef idx="1">
+            <a:schemeClr val="accent1"/>
+          </a:lnRef>
+          <a:fillRef idx="0">
+            <a:schemeClr val="accent1"/>
+          </a:fillRef>
+          <a:effectRef idx="0">
+            <a:schemeClr val="accent1"/>
+          </a:effectRef>
+          <a:fontRef idx="minor">
+            <a:schemeClr val="tx1"/>
+          </a:fontRef>
+        </p:style>
+      </p:cxnSp>
+      <p:cxnSp>
+        <p:nvCxnSpPr>
+          <p:cNvPr id="388" name="Conector recto de flecha 387">
+            <a:extLst>
+              <a:ext uri="{FF2B5EF4-FFF2-40B4-BE49-F238E27FC236}">
+                <a16:creationId xmlns:a16="http://schemas.microsoft.com/office/drawing/2014/main" id="{C34B704E-5103-D0AD-9A69-1953307E6D62}"/>
+              </a:ext>
+            </a:extLst>
+          </p:cNvPr>
+          <p:cNvCxnSpPr>
+            <a:cxnSpLocks/>
+          </p:cNvCxnSpPr>
+          <p:nvPr/>
+        </p:nvCxnSpPr>
+        <p:spPr>
+          <a:xfrm flipH="1">
+            <a:off x="2693737" y="2210834"/>
+            <a:ext cx="18039" cy="348954"/>
+          </a:xfrm>
+          <a:prstGeom prst="straightConnector1">
+            <a:avLst/>
+          </a:prstGeom>
+          <a:ln>
+            <a:tailEnd type="triangle"/>
+          </a:ln>
+        </p:spPr>
+        <p:style>
+          <a:lnRef idx="1">
+            <a:schemeClr val="accent1"/>
+          </a:lnRef>
+          <a:fillRef idx="0">
+            <a:schemeClr val="accent1"/>
+          </a:fillRef>
+          <a:effectRef idx="0">
+            <a:schemeClr val="accent1"/>
+          </a:effectRef>
+          <a:fontRef idx="minor">
+            <a:schemeClr val="tx1"/>
+          </a:fontRef>
+        </p:style>
+      </p:cxnSp>
+      <p:cxnSp>
+        <p:nvCxnSpPr>
+          <p:cNvPr id="389" name="Conector recto de flecha 388">
+            <a:extLst>
+              <a:ext uri="{FF2B5EF4-FFF2-40B4-BE49-F238E27FC236}">
+                <a16:creationId xmlns:a16="http://schemas.microsoft.com/office/drawing/2014/main" id="{4087EE1C-065A-F970-E872-9C8354E3F610}"/>
+              </a:ext>
+            </a:extLst>
+          </p:cNvPr>
+          <p:cNvCxnSpPr>
+            <a:cxnSpLocks/>
+          </p:cNvCxnSpPr>
+          <p:nvPr/>
+        </p:nvCxnSpPr>
+        <p:spPr>
+          <a:xfrm flipH="1">
+            <a:off x="3793822" y="2214223"/>
+            <a:ext cx="18039" cy="348954"/>
+          </a:xfrm>
+          <a:prstGeom prst="straightConnector1">
+            <a:avLst/>
+          </a:prstGeom>
+          <a:ln>
+            <a:tailEnd type="triangle"/>
+          </a:ln>
+        </p:spPr>
+        <p:style>
+          <a:lnRef idx="1">
+            <a:schemeClr val="accent1"/>
+          </a:lnRef>
+          <a:fillRef idx="0">
+            <a:schemeClr val="accent1"/>
+          </a:fillRef>
+          <a:effectRef idx="0">
+            <a:schemeClr val="accent1"/>
+          </a:effectRef>
+          <a:fontRef idx="minor">
+            <a:schemeClr val="tx1"/>
+          </a:fontRef>
+        </p:style>
+      </p:cxnSp>
+      <p:cxnSp>
+        <p:nvCxnSpPr>
+          <p:cNvPr id="390" name="Conector recto de flecha 389">
+            <a:extLst>
+              <a:ext uri="{FF2B5EF4-FFF2-40B4-BE49-F238E27FC236}">
+                <a16:creationId xmlns:a16="http://schemas.microsoft.com/office/drawing/2014/main" id="{DE38B5E3-F7C8-CDAB-1886-1662C00BFAA4}"/>
+              </a:ext>
+            </a:extLst>
+          </p:cNvPr>
+          <p:cNvCxnSpPr>
+            <a:cxnSpLocks/>
+          </p:cNvCxnSpPr>
+          <p:nvPr/>
+        </p:nvCxnSpPr>
+        <p:spPr>
+          <a:xfrm flipH="1">
+            <a:off x="4867781" y="2214223"/>
+            <a:ext cx="18039" cy="348954"/>
+          </a:xfrm>
+          <a:prstGeom prst="straightConnector1">
+            <a:avLst/>
+          </a:prstGeom>
+          <a:ln>
+            <a:tailEnd type="triangle"/>
+          </a:ln>
+        </p:spPr>
+        <p:style>
+          <a:lnRef idx="1">
+            <a:schemeClr val="accent1"/>
+          </a:lnRef>
+          <a:fillRef idx="0">
+            <a:schemeClr val="accent1"/>
+          </a:fillRef>
+          <a:effectRef idx="0">
+            <a:schemeClr val="accent1"/>
+          </a:effectRef>
+          <a:fontRef idx="minor">
+            <a:schemeClr val="tx1"/>
+          </a:fontRef>
+        </p:style>
+      </p:cxnSp>
+      <p:cxnSp>
+        <p:nvCxnSpPr>
+          <p:cNvPr id="391" name="Conector recto de flecha 390">
+            <a:extLst>
+              <a:ext uri="{FF2B5EF4-FFF2-40B4-BE49-F238E27FC236}">
+                <a16:creationId xmlns:a16="http://schemas.microsoft.com/office/drawing/2014/main" id="{DEBE976F-7B55-E1AB-184A-0BDE765BB8B2}"/>
+              </a:ext>
+            </a:extLst>
+          </p:cNvPr>
+          <p:cNvCxnSpPr>
+            <a:cxnSpLocks/>
+          </p:cNvCxnSpPr>
+          <p:nvPr/>
+        </p:nvCxnSpPr>
+        <p:spPr>
+          <a:xfrm flipH="1">
+            <a:off x="5974040" y="2216882"/>
+            <a:ext cx="18039" cy="348954"/>
+          </a:xfrm>
+          <a:prstGeom prst="straightConnector1">
+            <a:avLst/>
+          </a:prstGeom>
+          <a:ln>
+            <a:tailEnd type="triangle"/>
+          </a:ln>
+        </p:spPr>
+        <p:style>
+          <a:lnRef idx="1">
+            <a:schemeClr val="accent1"/>
+          </a:lnRef>
+          <a:fillRef idx="0">
+            <a:schemeClr val="accent1"/>
+          </a:fillRef>
+          <a:effectRef idx="0">
+            <a:schemeClr val="accent1"/>
+          </a:effectRef>
+          <a:fontRef idx="minor">
+            <a:schemeClr val="tx1"/>
+          </a:fontRef>
+        </p:style>
+      </p:cxnSp>
+      <p:cxnSp>
+        <p:nvCxnSpPr>
+          <p:cNvPr id="393" name="Conector recto de flecha 392">
+            <a:extLst>
+              <a:ext uri="{FF2B5EF4-FFF2-40B4-BE49-F238E27FC236}">
+                <a16:creationId xmlns:a16="http://schemas.microsoft.com/office/drawing/2014/main" id="{6D8FFA17-A6FF-42C4-2A1F-167021045F60}"/>
+              </a:ext>
+            </a:extLst>
+          </p:cNvPr>
+          <p:cNvCxnSpPr>
+            <a:cxnSpLocks/>
+            <a:stCxn id="18" idx="2"/>
+          </p:cNvCxnSpPr>
+          <p:nvPr/>
+        </p:nvCxnSpPr>
+        <p:spPr>
+          <a:xfrm>
+            <a:off x="2105248" y="1899375"/>
+            <a:ext cx="0" cy="308800"/>
+          </a:xfrm>
+          <a:prstGeom prst="straightConnector1">
+            <a:avLst/>
+          </a:prstGeom>
+          <a:ln>
+            <a:tailEnd type="triangle"/>
+          </a:ln>
+        </p:spPr>
+        <p:style>
+          <a:lnRef idx="1">
+            <a:schemeClr val="accent1"/>
+          </a:lnRef>
+          <a:fillRef idx="0">
+            <a:schemeClr val="accent1"/>
+          </a:fillRef>
+          <a:effectRef idx="0">
+            <a:schemeClr val="accent1"/>
+          </a:effectRef>
+          <a:fontRef idx="minor">
+            <a:schemeClr val="tx1"/>
+          </a:fontRef>
+        </p:style>
+      </p:cxnSp>
+      <p:cxnSp>
+        <p:nvCxnSpPr>
+          <p:cNvPr id="398" name="Conector recto de flecha 397">
+            <a:extLst>
+              <a:ext uri="{FF2B5EF4-FFF2-40B4-BE49-F238E27FC236}">
+                <a16:creationId xmlns:a16="http://schemas.microsoft.com/office/drawing/2014/main" id="{6DEE17CC-C71C-9717-AC1E-EAEFA17CBFE3}"/>
+              </a:ext>
+            </a:extLst>
+          </p:cNvPr>
+          <p:cNvCxnSpPr>
+            <a:cxnSpLocks/>
+          </p:cNvCxnSpPr>
+          <p:nvPr/>
+        </p:nvCxnSpPr>
+        <p:spPr>
+          <a:xfrm>
+            <a:off x="3214578" y="1908082"/>
+            <a:ext cx="0" cy="308800"/>
+          </a:xfrm>
+          <a:prstGeom prst="straightConnector1">
+            <a:avLst/>
+          </a:prstGeom>
+          <a:ln>
+            <a:tailEnd type="triangle"/>
+          </a:ln>
+        </p:spPr>
+        <p:style>
+          <a:lnRef idx="1">
+            <a:schemeClr val="accent1"/>
+          </a:lnRef>
+          <a:fillRef idx="0">
+            <a:schemeClr val="accent1"/>
+          </a:fillRef>
+          <a:effectRef idx="0">
+            <a:schemeClr val="accent1"/>
+          </a:effectRef>
+          <a:fontRef idx="minor">
+            <a:schemeClr val="tx1"/>
+          </a:fontRef>
+        </p:style>
+      </p:cxnSp>
+      <p:cxnSp>
+        <p:nvCxnSpPr>
+          <p:cNvPr id="399" name="Conector recto de flecha 398">
+            <a:extLst>
+              <a:ext uri="{FF2B5EF4-FFF2-40B4-BE49-F238E27FC236}">
+                <a16:creationId xmlns:a16="http://schemas.microsoft.com/office/drawing/2014/main" id="{DBEA1AC9-7281-9E6D-379E-82677CBEF4FB}"/>
+              </a:ext>
+            </a:extLst>
+          </p:cNvPr>
+          <p:cNvCxnSpPr>
+            <a:cxnSpLocks/>
+          </p:cNvCxnSpPr>
+          <p:nvPr/>
+        </p:nvCxnSpPr>
+        <p:spPr>
+          <a:xfrm>
+            <a:off x="4299099" y="1899374"/>
+            <a:ext cx="0" cy="308800"/>
+          </a:xfrm>
+          <a:prstGeom prst="straightConnector1">
+            <a:avLst/>
+          </a:prstGeom>
+          <a:ln>
+            <a:tailEnd type="triangle"/>
+          </a:ln>
+        </p:spPr>
+        <p:style>
+          <a:lnRef idx="1">
+            <a:schemeClr val="accent1"/>
+          </a:lnRef>
+          <a:fillRef idx="0">
+            <a:schemeClr val="accent1"/>
+          </a:fillRef>
+          <a:effectRef idx="0">
+            <a:schemeClr val="accent1"/>
+          </a:effectRef>
+          <a:fontRef idx="minor">
+            <a:schemeClr val="tx1"/>
+          </a:fontRef>
+        </p:style>
+      </p:cxnSp>
+    </p:spTree>
+    <p:extLst>
+      <p:ext uri="{BB962C8B-B14F-4D97-AF65-F5344CB8AC3E}">
+        <p14:creationId xmlns:p14="http://schemas.microsoft.com/office/powerpoint/2010/main" val="3259033352"/>
+      </p:ext>
+    </p:extLst>
+  </p:cSld>
+  <p:clrMapOvr>
+    <a:masterClrMapping/>
+  </p:clrMapOvr>
+</p:sld>
+</file>
+
+<file path=ppt/slides/slide11.xml><?xml version="1.0" encoding="utf-8"?>
+<p:sld xmlns:a="http://schemas.openxmlformats.org/drawingml/2006/main" xmlns:r="http://schemas.openxmlformats.org/officeDocument/2006/relationships" xmlns:p="http://schemas.openxmlformats.org/presentationml/2006/main">
+  <p:cSld>
+    <p:spTree>
+      <p:nvGrpSpPr>
+        <p:cNvPr id="1" name="Shape 273"/>
+        <p:cNvGrpSpPr/>
+        <p:nvPr/>
+      </p:nvGrpSpPr>
+      <p:grpSpPr>
+        <a:xfrm>
+          <a:off x="0" y="0"/>
+          <a:ext cx="0" cy="0"/>
+          <a:chOff x="0" y="0"/>
+          <a:chExt cx="0" cy="0"/>
+        </a:xfrm>
+      </p:grpSpPr>
+      <p:sp>
+        <p:nvSpPr>
+          <p:cNvPr id="275" name="Google Shape;275;p18"/>
+          <p:cNvSpPr txBox="1">
+            <a:spLocks noGrp="1"/>
+          </p:cNvSpPr>
+          <p:nvPr>
+            <p:ph type="sldNum" idx="12"/>
+          </p:nvPr>
+        </p:nvSpPr>
+        <p:spPr>
+          <a:xfrm>
+            <a:off x="4116400" y="4807500"/>
+            <a:ext cx="911100" cy="336000"/>
+          </a:xfrm>
+          <a:prstGeom prst="rect">
+            <a:avLst/>
+          </a:prstGeom>
+        </p:spPr>
+        <p:txBody>
+          <a:bodyPr spcFirstLastPara="1" wrap="square" lIns="91425" tIns="91425" rIns="91425" bIns="91425" anchor="ctr" anchorCtr="0">
+            <a:noAutofit/>
+          </a:bodyPr>
+          <a:lstStyle/>
+          <a:p>
+            <a:pPr marL="0" lvl="0" indent="0" algn="ctr" rtl="0">
+              <a:spcBef>
+                <a:spcPts val="0"/>
+              </a:spcBef>
+              <a:spcAft>
+                <a:spcPts val="0"/>
+              </a:spcAft>
+              <a:buNone/>
+            </a:pPr>
+            <a:fld id="{00000000-1234-1234-1234-123412341234}" type="slidenum">
+              <a:rPr lang="en"/>
+              <a:t>11</a:t>
+            </a:fld>
+            <a:endParaRPr/>
+          </a:p>
+        </p:txBody>
+      </p:sp>
+      <p:pic>
+        <p:nvPicPr>
+          <p:cNvPr id="4" name="Imagen 3">
+            <a:extLst>
+              <a:ext uri="{FF2B5EF4-FFF2-40B4-BE49-F238E27FC236}">
+                <a16:creationId xmlns:a16="http://schemas.microsoft.com/office/drawing/2014/main" id="{867BB939-6888-E7DD-CB74-C42C7CEEC064}"/>
+              </a:ext>
+            </a:extLst>
+          </p:cNvPr>
+          <p:cNvPicPr>
+            <a:picLocks noChangeAspect="1"/>
+          </p:cNvPicPr>
+          <p:nvPr/>
+        </p:nvPicPr>
+        <p:blipFill>
+          <a:blip r:embed="rId3"/>
+          <a:stretch>
+            <a:fillRect/>
+          </a:stretch>
+        </p:blipFill>
+        <p:spPr>
+          <a:xfrm>
+            <a:off x="2524640" y="1173822"/>
+            <a:ext cx="4094720" cy="3223249"/>
+          </a:xfrm>
+          <a:prstGeom prst="rect">
+            <a:avLst/>
+          </a:prstGeom>
+        </p:spPr>
+      </p:pic>
+    </p:spTree>
+    <p:extLst>
+      <p:ext uri="{BB962C8B-B14F-4D97-AF65-F5344CB8AC3E}">
+        <p14:creationId xmlns:p14="http://schemas.microsoft.com/office/powerpoint/2010/main" val="3813945401"/>
+      </p:ext>
+    </p:extLst>
+  </p:cSld>
+  <p:clrMapOvr>
+    <a:masterClrMapping/>
+  </p:clrMapOvr>
+</p:sld>
+</file>
+
 <file path=ppt/slides/slide2.xml><?xml version="1.0" encoding="utf-8"?>
 <p:sld xmlns:a="http://schemas.openxmlformats.org/drawingml/2006/main" xmlns:r="http://schemas.openxmlformats.org/officeDocument/2006/relationships" xmlns:p="http://schemas.openxmlformats.org/presentationml/2006/main">
   <p:cSld>
@@ -47239,6 +49297,238 @@
         </p:txBody>
       </p:sp>
     </p:spTree>
+  </p:cSld>
+  <p:clrMapOvr>
+    <a:masterClrMapping/>
+  </p:clrMapOvr>
+</p:sld>
+</file>
+
+<file path=ppt/slides/slide9.xml><?xml version="1.0" encoding="utf-8"?>
+<p:sld xmlns:a="http://schemas.openxmlformats.org/drawingml/2006/main" xmlns:r="http://schemas.openxmlformats.org/officeDocument/2006/relationships" xmlns:p="http://schemas.openxmlformats.org/presentationml/2006/main">
+  <p:cSld>
+    <p:spTree>
+      <p:nvGrpSpPr>
+        <p:cNvPr id="1" name="Shape 260"/>
+        <p:cNvGrpSpPr/>
+        <p:nvPr/>
+      </p:nvGrpSpPr>
+      <p:grpSpPr>
+        <a:xfrm>
+          <a:off x="0" y="0"/>
+          <a:ext cx="0" cy="0"/>
+          <a:chOff x="0" y="0"/>
+          <a:chExt cx="0" cy="0"/>
+        </a:xfrm>
+      </p:grpSpPr>
+      <p:sp>
+        <p:nvSpPr>
+          <p:cNvPr id="261" name="Google Shape;261;p16"/>
+          <p:cNvSpPr txBox="1">
+            <a:spLocks noGrp="1"/>
+          </p:cNvSpPr>
+          <p:nvPr>
+            <p:ph type="title"/>
+          </p:nvPr>
+        </p:nvSpPr>
+        <p:spPr>
+          <a:xfrm>
+            <a:off x="403805" y="93065"/>
+            <a:ext cx="5138700" cy="857400"/>
+          </a:xfrm>
+          <a:prstGeom prst="rect">
+            <a:avLst/>
+          </a:prstGeom>
+        </p:spPr>
+        <p:txBody>
+          <a:bodyPr spcFirstLastPara="1" wrap="square" lIns="91425" tIns="91425" rIns="91425" bIns="91425" anchor="b" anchorCtr="0">
+            <a:noAutofit/>
+          </a:bodyPr>
+          <a:lstStyle/>
+          <a:p>
+            <a:pPr marL="0" lvl="0" indent="0" algn="l" rtl="0">
+              <a:spcBef>
+                <a:spcPts val="0"/>
+              </a:spcBef>
+              <a:spcAft>
+                <a:spcPts val="0"/>
+              </a:spcAft>
+              <a:buNone/>
+            </a:pPr>
+            <a:r>
+              <a:rPr lang="es-MX"/>
+              <a:t>Tipos de contrato</a:t>
+            </a:r>
+          </a:p>
+        </p:txBody>
+      </p:sp>
+      <p:sp>
+        <p:nvSpPr>
+          <p:cNvPr id="262" name="Google Shape;262;p16"/>
+          <p:cNvSpPr txBox="1">
+            <a:spLocks noGrp="1"/>
+          </p:cNvSpPr>
+          <p:nvPr>
+            <p:ph type="body" idx="1"/>
+          </p:nvPr>
+        </p:nvSpPr>
+        <p:spPr>
+          <a:xfrm>
+            <a:off x="225846" y="1429138"/>
+            <a:ext cx="5138700" cy="1506341"/>
+          </a:xfrm>
+          <a:prstGeom prst="rect">
+            <a:avLst/>
+          </a:prstGeom>
+        </p:spPr>
+        <p:txBody>
+          <a:bodyPr spcFirstLastPara="1" wrap="square" lIns="91425" tIns="91425" rIns="91425" bIns="91425" anchor="t" anchorCtr="0">
+            <a:noAutofit/>
+          </a:bodyPr>
+          <a:lstStyle/>
+          <a:p>
+            <a:pPr marL="457200" lvl="0" indent="-381000" algn="l" rtl="0">
+              <a:spcBef>
+                <a:spcPts val="600"/>
+              </a:spcBef>
+              <a:spcAft>
+                <a:spcPts val="0"/>
+              </a:spcAft>
+              <a:buSzPts val="2400"/>
+              <a:buChar char="▹"/>
+            </a:pPr>
+            <a:r>
+              <a:rPr lang="es-MX"/>
+              <a:t>Contrato a termino fijo </a:t>
+            </a:r>
+          </a:p>
+          <a:p>
+            <a:pPr marL="457200" lvl="0" indent="-381000" algn="l" rtl="0">
+              <a:spcBef>
+                <a:spcPts val="600"/>
+              </a:spcBef>
+              <a:spcAft>
+                <a:spcPts val="0"/>
+              </a:spcAft>
+              <a:buSzPts val="2400"/>
+              <a:buChar char="▹"/>
+            </a:pPr>
+            <a:r>
+              <a:rPr lang="es-MX"/>
+              <a:t>Contrato a termino indefinido</a:t>
+            </a:r>
+          </a:p>
+          <a:p>
+            <a:pPr marL="457200" lvl="0" indent="-381000" algn="l" rtl="0">
+              <a:spcBef>
+                <a:spcPts val="600"/>
+              </a:spcBef>
+              <a:spcAft>
+                <a:spcPts val="0"/>
+              </a:spcAft>
+              <a:buSzPts val="2400"/>
+              <a:buChar char="▹"/>
+            </a:pPr>
+            <a:r>
+              <a:rPr lang="es-MX"/>
+              <a:t>Contratacion civil por prestacion de servicios</a:t>
+            </a:r>
+          </a:p>
+          <a:p>
+            <a:pPr marL="457200" lvl="0" indent="-381000" algn="l" rtl="0">
+              <a:spcBef>
+                <a:spcPts val="600"/>
+              </a:spcBef>
+              <a:spcAft>
+                <a:spcPts val="0"/>
+              </a:spcAft>
+              <a:buSzPts val="2400"/>
+              <a:buChar char="▹"/>
+            </a:pPr>
+            <a:r>
+              <a:rPr lang="es-MX"/>
+              <a:t>Contratacion por servicios</a:t>
+            </a:r>
+          </a:p>
+          <a:p>
+            <a:pPr marL="457200" lvl="0" indent="-381000" algn="l" rtl="0">
+              <a:spcBef>
+                <a:spcPts val="600"/>
+              </a:spcBef>
+              <a:spcAft>
+                <a:spcPts val="0"/>
+              </a:spcAft>
+              <a:buSzPts val="2400"/>
+              <a:buChar char="▹"/>
+            </a:pPr>
+            <a:r>
+              <a:rPr lang="es-MX"/>
+              <a:t>Contrato por asesorias</a:t>
+            </a:r>
+          </a:p>
+          <a:p>
+            <a:pPr marL="457200" lvl="0" indent="-381000" algn="l" rtl="0">
+              <a:spcBef>
+                <a:spcPts val="600"/>
+              </a:spcBef>
+              <a:spcAft>
+                <a:spcPts val="0"/>
+              </a:spcAft>
+              <a:buSzPts val="2400"/>
+              <a:buChar char="▹"/>
+            </a:pPr>
+            <a:endParaRPr lang="es-MX"/>
+          </a:p>
+        </p:txBody>
+      </p:sp>
+      <p:sp>
+        <p:nvSpPr>
+          <p:cNvPr id="263" name="Google Shape;263;p16"/>
+          <p:cNvSpPr txBox="1">
+            <a:spLocks noGrp="1"/>
+          </p:cNvSpPr>
+          <p:nvPr>
+            <p:ph type="sldNum" idx="12"/>
+          </p:nvPr>
+        </p:nvSpPr>
+        <p:spPr>
+          <a:xfrm>
+            <a:off x="8808000" y="2208279"/>
+            <a:ext cx="336000" cy="727200"/>
+          </a:xfrm>
+          <a:prstGeom prst="rect">
+            <a:avLst/>
+          </a:prstGeom>
+        </p:spPr>
+        <p:txBody>
+          <a:bodyPr spcFirstLastPara="1" wrap="square" lIns="91425" tIns="91425" rIns="91425" bIns="91425" anchor="ctr" anchorCtr="0">
+            <a:noAutofit/>
+          </a:bodyPr>
+          <a:lstStyle/>
+          <a:p>
+            <a:pPr marL="0" lvl="0" indent="0" algn="ctr" rtl="0">
+              <a:spcBef>
+                <a:spcPts val="0"/>
+              </a:spcBef>
+              <a:spcAft>
+                <a:spcPts val="0"/>
+              </a:spcAft>
+              <a:buNone/>
+            </a:pPr>
+            <a:fld id="{00000000-1234-1234-1234-123412341234}" type="slidenum">
+              <a:rPr lang="en"/>
+              <a:t>9</a:t>
+            </a:fld>
+            <a:endParaRPr/>
+          </a:p>
+        </p:txBody>
+      </p:sp>
+    </p:spTree>
+    <p:extLst>
+      <p:ext uri="{BB962C8B-B14F-4D97-AF65-F5344CB8AC3E}">
+        <p14:creationId xmlns:p14="http://schemas.microsoft.com/office/powerpoint/2010/main" val="1866388024"/>
+      </p:ext>
+    </p:extLst>
   </p:cSld>
   <p:clrMapOvr>
     <a:masterClrMapping/>

</xml_diff>

<commit_message>
planteamiento del problema investigacion anteproyecto
</commit_message>
<xml_diff>
--- a/13 Modelos de negocios/Empresa Outtic.pptx
+++ b/13 Modelos de negocios/Empresa Outtic.pptx
@@ -5,7 +5,7 @@
     <p:sldMasterId id="2147483659" r:id="rId1"/>
   </p:sldMasterIdLst>
   <p:notesMasterIdLst>
-    <p:notesMasterId r:id="rId13"/>
+    <p:notesMasterId r:id="rId14"/>
   </p:notesMasterIdLst>
   <p:sldIdLst>
     <p:sldId id="256" r:id="rId2"/>
@@ -18,43 +18,44 @@
     <p:sldId id="287" r:id="rId9"/>
     <p:sldId id="290" r:id="rId10"/>
     <p:sldId id="288" r:id="rId11"/>
-    <p:sldId id="291" r:id="rId12"/>
+    <p:sldId id="292" r:id="rId12"/>
+    <p:sldId id="291" r:id="rId13"/>
   </p:sldIdLst>
   <p:sldSz cx="9144000" cy="5143500" type="screen16x9"/>
   <p:notesSz cx="6858000" cy="9144000"/>
   <p:embeddedFontLst>
     <p:embeddedFont>
       <p:font typeface="Barlow" panose="00000500000000000000" pitchFamily="2" charset="0"/>
-      <p:regular r:id="rId14"/>
-      <p:bold r:id="rId15"/>
-      <p:italic r:id="rId16"/>
-      <p:boldItalic r:id="rId17"/>
+      <p:regular r:id="rId15"/>
+      <p:bold r:id="rId16"/>
+      <p:italic r:id="rId17"/>
+      <p:boldItalic r:id="rId18"/>
     </p:embeddedFont>
     <p:embeddedFont>
       <p:font typeface="Barlow Light" panose="00000400000000000000" pitchFamily="2" charset="0"/>
-      <p:regular r:id="rId18"/>
-      <p:bold r:id="rId19"/>
-      <p:italic r:id="rId20"/>
-      <p:boldItalic r:id="rId21"/>
+      <p:regular r:id="rId19"/>
+      <p:bold r:id="rId20"/>
+      <p:italic r:id="rId21"/>
+      <p:boldItalic r:id="rId22"/>
     </p:embeddedFont>
     <p:embeddedFont>
       <p:font typeface="Calibri" panose="020F0502020204030204" pitchFamily="34" charset="0"/>
-      <p:regular r:id="rId22"/>
-      <p:bold r:id="rId23"/>
-      <p:italic r:id="rId24"/>
-      <p:boldItalic r:id="rId25"/>
+      <p:regular r:id="rId23"/>
+      <p:bold r:id="rId24"/>
+      <p:italic r:id="rId25"/>
+      <p:boldItalic r:id="rId26"/>
     </p:embeddedFont>
     <p:embeddedFont>
       <p:font typeface="Miriam Libre" panose="00000500000000000000" pitchFamily="2" charset="-79"/>
-      <p:regular r:id="rId26"/>
-      <p:bold r:id="rId27"/>
+      <p:regular r:id="rId27"/>
+      <p:bold r:id="rId28"/>
     </p:embeddedFont>
     <p:embeddedFont>
       <p:font typeface="Work Sans" pitchFamily="2" charset="0"/>
-      <p:regular r:id="rId28"/>
-      <p:bold r:id="rId29"/>
-      <p:italic r:id="rId30"/>
-      <p:boldItalic r:id="rId31"/>
+      <p:regular r:id="rId29"/>
+      <p:bold r:id="rId30"/>
+      <p:italic r:id="rId31"/>
+      <p:boldItalic r:id="rId32"/>
     </p:embeddedFont>
   </p:embeddedFontLst>
   <p:defaultTextStyle>
@@ -33159,7 +33160,7 @@
                   </a:schemeClr>
                 </a:solidFill>
               </a:rPr>
-              <a:t>Ceo1</a:t>
+              <a:t>Jefe1</a:t>
             </a:r>
           </a:p>
         </p:txBody>
@@ -33215,7 +33216,7 @@
                   </a:schemeClr>
                 </a:solidFill>
               </a:rPr>
-              <a:t>Ceo2</a:t>
+              <a:t>Jefe2</a:t>
             </a:r>
           </a:p>
         </p:txBody>
@@ -33271,7 +33272,7 @@
                   </a:schemeClr>
                 </a:solidFill>
               </a:rPr>
-              <a:t>Ceo3</a:t>
+              <a:t>Jefe3</a:t>
             </a:r>
           </a:p>
         </p:txBody>
@@ -34634,6 +34635,145 @@
   <p:cSld>
     <p:spTree>
       <p:nvGrpSpPr>
+        <p:cNvPr id="1" name=""/>
+        <p:cNvGrpSpPr/>
+        <p:nvPr/>
+      </p:nvGrpSpPr>
+      <p:grpSpPr>
+        <a:xfrm>
+          <a:off x="0" y="0"/>
+          <a:ext cx="0" cy="0"/>
+          <a:chOff x="0" y="0"/>
+          <a:chExt cx="0" cy="0"/>
+        </a:xfrm>
+      </p:grpSpPr>
+      <p:sp>
+        <p:nvSpPr>
+          <p:cNvPr id="2" name="Título 1">
+            <a:extLst>
+              <a:ext uri="{FF2B5EF4-FFF2-40B4-BE49-F238E27FC236}">
+                <a16:creationId xmlns:a16="http://schemas.microsoft.com/office/drawing/2014/main" id="{D0F0BA0D-B8E4-9E33-551C-3A88161A8711}"/>
+              </a:ext>
+            </a:extLst>
+          </p:cNvPr>
+          <p:cNvSpPr>
+            <a:spLocks noGrp="1"/>
+          </p:cNvSpPr>
+          <p:nvPr>
+            <p:ph type="title"/>
+          </p:nvPr>
+        </p:nvSpPr>
+        <p:spPr/>
+        <p:txBody>
+          <a:bodyPr/>
+          <a:lstStyle/>
+          <a:p>
+            <a:r>
+              <a:rPr lang="es-MX" dirty="0"/>
+              <a:t>Arquitectura del sitio Web</a:t>
+            </a:r>
+          </a:p>
+        </p:txBody>
+      </p:sp>
+      <p:sp>
+        <p:nvSpPr>
+          <p:cNvPr id="6" name="Marcador de número de diapositiva 5">
+            <a:extLst>
+              <a:ext uri="{FF2B5EF4-FFF2-40B4-BE49-F238E27FC236}">
+                <a16:creationId xmlns:a16="http://schemas.microsoft.com/office/drawing/2014/main" id="{02F18B8F-D25E-51B3-DD21-423532634130}"/>
+              </a:ext>
+            </a:extLst>
+          </p:cNvPr>
+          <p:cNvSpPr>
+            <a:spLocks noGrp="1"/>
+          </p:cNvSpPr>
+          <p:nvPr>
+            <p:ph type="sldNum" idx="12"/>
+          </p:nvPr>
+        </p:nvSpPr>
+        <p:spPr/>
+        <p:txBody>
+          <a:bodyPr/>
+          <a:lstStyle/>
+          <a:p>
+            <a:pPr marL="0" lvl="0" indent="0" algn="ctr" rtl="0">
+              <a:spcBef>
+                <a:spcPts val="0"/>
+              </a:spcBef>
+              <a:spcAft>
+                <a:spcPts val="0"/>
+              </a:spcAft>
+              <a:buNone/>
+            </a:pPr>
+            <a:fld id="{00000000-1234-1234-1234-123412341234}" type="slidenum">
+              <a:rPr lang="es-MX" smtClean="0"/>
+              <a:t>11</a:t>
+            </a:fld>
+            <a:endParaRPr lang="es-MX" dirty="0"/>
+          </a:p>
+        </p:txBody>
+      </p:sp>
+      <p:pic>
+        <p:nvPicPr>
+          <p:cNvPr id="8" name="Imagen 7">
+            <a:extLst>
+              <a:ext uri="{FF2B5EF4-FFF2-40B4-BE49-F238E27FC236}">
+                <a16:creationId xmlns:a16="http://schemas.microsoft.com/office/drawing/2014/main" id="{A3AB40C7-CA0D-4F5D-A753-B74820BBE82B}"/>
+              </a:ext>
+            </a:extLst>
+          </p:cNvPr>
+          <p:cNvPicPr>
+            <a:picLocks noChangeAspect="1"/>
+          </p:cNvPicPr>
+          <p:nvPr/>
+        </p:nvPicPr>
+        <p:blipFill>
+          <a:blip r:embed="rId2"/>
+          <a:stretch>
+            <a:fillRect/>
+          </a:stretch>
+        </p:blipFill>
+        <p:spPr>
+          <a:xfrm>
+            <a:off x="174765" y="1788933"/>
+            <a:ext cx="5703570" cy="2767592"/>
+          </a:xfrm>
+          <a:prstGeom prst="roundRect">
+            <a:avLst>
+              <a:gd name="adj" fmla="val 8594"/>
+            </a:avLst>
+          </a:prstGeom>
+          <a:solidFill>
+            <a:srgbClr val="FFFFFF">
+              <a:shade val="85000"/>
+            </a:srgbClr>
+          </a:solidFill>
+          <a:ln>
+            <a:noFill/>
+          </a:ln>
+          <a:effectLst>
+            <a:reflection blurRad="12700" stA="38000" endPos="28000" dist="5000" dir="5400000" sy="-100000" algn="bl" rotWithShape="0"/>
+          </a:effectLst>
+        </p:spPr>
+      </p:pic>
+    </p:spTree>
+    <p:extLst>
+      <p:ext uri="{BB962C8B-B14F-4D97-AF65-F5344CB8AC3E}">
+        <p14:creationId xmlns:p14="http://schemas.microsoft.com/office/powerpoint/2010/main" val="2572740147"/>
+      </p:ext>
+    </p:extLst>
+  </p:cSld>
+  <p:clrMapOvr>
+    <a:masterClrMapping/>
+  </p:clrMapOvr>
+</p:sld>
+</file>
+
+<file path=ppt/slides/slide12.xml><?xml version="1.0" encoding="utf-8"?>
+<p:sld xmlns:a="http://schemas.openxmlformats.org/drawingml/2006/main" xmlns:r="http://schemas.openxmlformats.org/officeDocument/2006/relationships" xmlns:p="http://schemas.openxmlformats.org/presentationml/2006/main">
+  <p:cSld>
+    <p:spTree>
+      <p:nvGrpSpPr>
         <p:cNvPr id="1" name="Shape 273"/>
         <p:cNvGrpSpPr/>
         <p:nvPr/>
@@ -34682,7 +34822,7 @@
             </a:pPr>
             <a:fld id="{00000000-1234-1234-1234-123412341234}" type="slidenum">
               <a:rPr lang="en"/>
-              <a:t>11</a:t>
+              <a:t>12</a:t>
             </a:fld>
             <a:endParaRPr/>
           </a:p>

</xml_diff>

<commit_message>
Tareas fin de semana 20/10
</commit_message>
<xml_diff>
--- a/13 Modelos de negocios/Empresa Outtic.pptx
+++ b/13 Modelos de negocios/Empresa Outtic.pptx
@@ -5,7 +5,7 @@
     <p:sldMasterId id="2147483659" r:id="rId1"/>
   </p:sldMasterIdLst>
   <p:notesMasterIdLst>
-    <p:notesMasterId r:id="rId14"/>
+    <p:notesMasterId r:id="rId17"/>
   </p:notesMasterIdLst>
   <p:sldIdLst>
     <p:sldId id="256" r:id="rId2"/>
@@ -16,46 +16,49 @@
     <p:sldId id="271" r:id="rId7"/>
     <p:sldId id="273" r:id="rId8"/>
     <p:sldId id="287" r:id="rId9"/>
-    <p:sldId id="290" r:id="rId10"/>
-    <p:sldId id="288" r:id="rId11"/>
-    <p:sldId id="292" r:id="rId12"/>
-    <p:sldId id="291" r:id="rId13"/>
+    <p:sldId id="293" r:id="rId10"/>
+    <p:sldId id="294" r:id="rId11"/>
+    <p:sldId id="295" r:id="rId12"/>
+    <p:sldId id="290" r:id="rId13"/>
+    <p:sldId id="288" r:id="rId14"/>
+    <p:sldId id="292" r:id="rId15"/>
+    <p:sldId id="291" r:id="rId16"/>
   </p:sldIdLst>
   <p:sldSz cx="9144000" cy="5143500" type="screen16x9"/>
   <p:notesSz cx="6858000" cy="9144000"/>
   <p:embeddedFontLst>
     <p:embeddedFont>
       <p:font typeface="Barlow" panose="00000500000000000000" pitchFamily="2" charset="0"/>
-      <p:regular r:id="rId15"/>
-      <p:bold r:id="rId16"/>
-      <p:italic r:id="rId17"/>
-      <p:boldItalic r:id="rId18"/>
+      <p:regular r:id="rId18"/>
+      <p:bold r:id="rId19"/>
+      <p:italic r:id="rId20"/>
+      <p:boldItalic r:id="rId21"/>
     </p:embeddedFont>
     <p:embeddedFont>
       <p:font typeface="Barlow Light" panose="00000400000000000000" pitchFamily="2" charset="0"/>
-      <p:regular r:id="rId19"/>
-      <p:bold r:id="rId20"/>
-      <p:italic r:id="rId21"/>
-      <p:boldItalic r:id="rId22"/>
+      <p:regular r:id="rId22"/>
+      <p:bold r:id="rId23"/>
+      <p:italic r:id="rId24"/>
+      <p:boldItalic r:id="rId25"/>
     </p:embeddedFont>
     <p:embeddedFont>
       <p:font typeface="Calibri" panose="020F0502020204030204" pitchFamily="34" charset="0"/>
-      <p:regular r:id="rId23"/>
-      <p:bold r:id="rId24"/>
-      <p:italic r:id="rId25"/>
-      <p:boldItalic r:id="rId26"/>
+      <p:regular r:id="rId26"/>
+      <p:bold r:id="rId27"/>
+      <p:italic r:id="rId28"/>
+      <p:boldItalic r:id="rId29"/>
     </p:embeddedFont>
     <p:embeddedFont>
       <p:font typeface="Miriam Libre" panose="00000500000000000000" pitchFamily="2" charset="-79"/>
-      <p:regular r:id="rId27"/>
-      <p:bold r:id="rId28"/>
+      <p:regular r:id="rId30"/>
+      <p:bold r:id="rId31"/>
     </p:embeddedFont>
     <p:embeddedFont>
       <p:font typeface="Work Sans" pitchFamily="2" charset="0"/>
-      <p:regular r:id="rId29"/>
-      <p:bold r:id="rId30"/>
-      <p:italic r:id="rId31"/>
-      <p:boldItalic r:id="rId32"/>
+      <p:regular r:id="rId32"/>
+      <p:bold r:id="rId33"/>
+      <p:italic r:id="rId34"/>
+      <p:boldItalic r:id="rId35"/>
     </p:embeddedFont>
   </p:embeddedFontLst>
   <p:defaultTextStyle>
@@ -845,6 +848,333 @@
   <p:cSld>
     <p:spTree>
       <p:nvGrpSpPr>
+        <p:cNvPr id="1" name="Shape 257"/>
+        <p:cNvGrpSpPr/>
+        <p:nvPr/>
+      </p:nvGrpSpPr>
+      <p:grpSpPr>
+        <a:xfrm>
+          <a:off x="0" y="0"/>
+          <a:ext cx="0" cy="0"/>
+          <a:chOff x="0" y="0"/>
+          <a:chExt cx="0" cy="0"/>
+        </a:xfrm>
+      </p:grpSpPr>
+      <p:sp>
+        <p:nvSpPr>
+          <p:cNvPr id="258" name="Google Shape;258;p:notes"/>
+          <p:cNvSpPr>
+            <a:spLocks noGrp="1" noRot="1" noChangeAspect="1"/>
+          </p:cNvSpPr>
+          <p:nvPr>
+            <p:ph type="sldImg" idx="2"/>
+          </p:nvPr>
+        </p:nvSpPr>
+        <p:spPr>
+          <a:xfrm>
+            <a:off x="381000" y="685800"/>
+            <a:ext cx="6096000" cy="3429000"/>
+          </a:xfrm>
+          <a:custGeom>
+            <a:avLst/>
+            <a:gdLst/>
+            <a:ahLst/>
+            <a:cxnLst/>
+            <a:rect l="l" t="t" r="r" b="b"/>
+            <a:pathLst>
+              <a:path w="120000" h="120000" extrusionOk="0">
+                <a:moveTo>
+                  <a:pt x="0" y="0"/>
+                </a:moveTo>
+                <a:lnTo>
+                  <a:pt x="120000" y="0"/>
+                </a:lnTo>
+                <a:lnTo>
+                  <a:pt x="120000" y="120000"/>
+                </a:lnTo>
+                <a:lnTo>
+                  <a:pt x="0" y="120000"/>
+                </a:lnTo>
+                <a:close/>
+              </a:path>
+            </a:pathLst>
+          </a:custGeom>
+        </p:spPr>
+      </p:sp>
+      <p:sp>
+        <p:nvSpPr>
+          <p:cNvPr id="259" name="Google Shape;259;p:notes"/>
+          <p:cNvSpPr txBox="1">
+            <a:spLocks noGrp="1"/>
+          </p:cNvSpPr>
+          <p:nvPr>
+            <p:ph type="body" idx="1"/>
+          </p:nvPr>
+        </p:nvSpPr>
+        <p:spPr>
+          <a:xfrm>
+            <a:off x="685800" y="4343400"/>
+            <a:ext cx="5486400" cy="4114800"/>
+          </a:xfrm>
+          <a:prstGeom prst="rect">
+            <a:avLst/>
+          </a:prstGeom>
+        </p:spPr>
+        <p:txBody>
+          <a:bodyPr spcFirstLastPara="1" wrap="square" lIns="91425" tIns="91425" rIns="91425" bIns="91425" anchor="t" anchorCtr="0">
+            <a:noAutofit/>
+          </a:bodyPr>
+          <a:lstStyle/>
+          <a:p>
+            <a:pPr marL="0" lvl="0" indent="0" algn="l" rtl="0">
+              <a:spcBef>
+                <a:spcPts val="0"/>
+              </a:spcBef>
+              <a:spcAft>
+                <a:spcPts val="0"/>
+              </a:spcAft>
+              <a:buNone/>
+            </a:pPr>
+            <a:endParaRPr/>
+          </a:p>
+        </p:txBody>
+      </p:sp>
+    </p:spTree>
+    <p:extLst>
+      <p:ext uri="{BB962C8B-B14F-4D97-AF65-F5344CB8AC3E}">
+        <p14:creationId xmlns:p14="http://schemas.microsoft.com/office/powerpoint/2010/main" val="2918921846"/>
+      </p:ext>
+    </p:extLst>
+  </p:cSld>
+  <p:clrMapOvr>
+    <a:masterClrMapping/>
+  </p:clrMapOvr>
+</p:notes>
+</file>
+
+<file path=ppt/notesSlides/notesSlide11.xml><?xml version="1.0" encoding="utf-8"?>
+<p:notes xmlns:a="http://schemas.openxmlformats.org/drawingml/2006/main" xmlns:r="http://schemas.openxmlformats.org/officeDocument/2006/relationships" xmlns:p="http://schemas.openxmlformats.org/presentationml/2006/main" showMasterSp="0" showMasterPhAnim="0">
+  <p:cSld>
+    <p:spTree>
+      <p:nvGrpSpPr>
+        <p:cNvPr id="1" name="Shape 257"/>
+        <p:cNvGrpSpPr/>
+        <p:nvPr/>
+      </p:nvGrpSpPr>
+      <p:grpSpPr>
+        <a:xfrm>
+          <a:off x="0" y="0"/>
+          <a:ext cx="0" cy="0"/>
+          <a:chOff x="0" y="0"/>
+          <a:chExt cx="0" cy="0"/>
+        </a:xfrm>
+      </p:grpSpPr>
+      <p:sp>
+        <p:nvSpPr>
+          <p:cNvPr id="258" name="Google Shape;258;p:notes"/>
+          <p:cNvSpPr>
+            <a:spLocks noGrp="1" noRot="1" noChangeAspect="1"/>
+          </p:cNvSpPr>
+          <p:nvPr>
+            <p:ph type="sldImg" idx="2"/>
+          </p:nvPr>
+        </p:nvSpPr>
+        <p:spPr>
+          <a:xfrm>
+            <a:off x="381000" y="685800"/>
+            <a:ext cx="6096000" cy="3429000"/>
+          </a:xfrm>
+          <a:custGeom>
+            <a:avLst/>
+            <a:gdLst/>
+            <a:ahLst/>
+            <a:cxnLst/>
+            <a:rect l="l" t="t" r="r" b="b"/>
+            <a:pathLst>
+              <a:path w="120000" h="120000" extrusionOk="0">
+                <a:moveTo>
+                  <a:pt x="0" y="0"/>
+                </a:moveTo>
+                <a:lnTo>
+                  <a:pt x="120000" y="0"/>
+                </a:lnTo>
+                <a:lnTo>
+                  <a:pt x="120000" y="120000"/>
+                </a:lnTo>
+                <a:lnTo>
+                  <a:pt x="0" y="120000"/>
+                </a:lnTo>
+                <a:close/>
+              </a:path>
+            </a:pathLst>
+          </a:custGeom>
+        </p:spPr>
+      </p:sp>
+      <p:sp>
+        <p:nvSpPr>
+          <p:cNvPr id="259" name="Google Shape;259;p:notes"/>
+          <p:cNvSpPr txBox="1">
+            <a:spLocks noGrp="1"/>
+          </p:cNvSpPr>
+          <p:nvPr>
+            <p:ph type="body" idx="1"/>
+          </p:nvPr>
+        </p:nvSpPr>
+        <p:spPr>
+          <a:xfrm>
+            <a:off x="685800" y="4343400"/>
+            <a:ext cx="5486400" cy="4114800"/>
+          </a:xfrm>
+          <a:prstGeom prst="rect">
+            <a:avLst/>
+          </a:prstGeom>
+        </p:spPr>
+        <p:txBody>
+          <a:bodyPr spcFirstLastPara="1" wrap="square" lIns="91425" tIns="91425" rIns="91425" bIns="91425" anchor="t" anchorCtr="0">
+            <a:noAutofit/>
+          </a:bodyPr>
+          <a:lstStyle/>
+          <a:p>
+            <a:pPr marL="0" lvl="0" indent="0" algn="l" rtl="0">
+              <a:spcBef>
+                <a:spcPts val="0"/>
+              </a:spcBef>
+              <a:spcAft>
+                <a:spcPts val="0"/>
+              </a:spcAft>
+              <a:buNone/>
+            </a:pPr>
+            <a:endParaRPr/>
+          </a:p>
+        </p:txBody>
+      </p:sp>
+    </p:spTree>
+    <p:extLst>
+      <p:ext uri="{BB962C8B-B14F-4D97-AF65-F5344CB8AC3E}">
+        <p14:creationId xmlns:p14="http://schemas.microsoft.com/office/powerpoint/2010/main" val="3024203158"/>
+      </p:ext>
+    </p:extLst>
+  </p:cSld>
+  <p:clrMapOvr>
+    <a:masterClrMapping/>
+  </p:clrMapOvr>
+</p:notes>
+</file>
+
+<file path=ppt/notesSlides/notesSlide12.xml><?xml version="1.0" encoding="utf-8"?>
+<p:notes xmlns:a="http://schemas.openxmlformats.org/drawingml/2006/main" xmlns:r="http://schemas.openxmlformats.org/officeDocument/2006/relationships" xmlns:p="http://schemas.openxmlformats.org/presentationml/2006/main" showMasterSp="0" showMasterPhAnim="0">
+  <p:cSld>
+    <p:spTree>
+      <p:nvGrpSpPr>
+        <p:cNvPr id="1" name="Shape 257"/>
+        <p:cNvGrpSpPr/>
+        <p:nvPr/>
+      </p:nvGrpSpPr>
+      <p:grpSpPr>
+        <a:xfrm>
+          <a:off x="0" y="0"/>
+          <a:ext cx="0" cy="0"/>
+          <a:chOff x="0" y="0"/>
+          <a:chExt cx="0" cy="0"/>
+        </a:xfrm>
+      </p:grpSpPr>
+      <p:sp>
+        <p:nvSpPr>
+          <p:cNvPr id="258" name="Google Shape;258;p:notes"/>
+          <p:cNvSpPr>
+            <a:spLocks noGrp="1" noRot="1" noChangeAspect="1"/>
+          </p:cNvSpPr>
+          <p:nvPr>
+            <p:ph type="sldImg" idx="2"/>
+          </p:nvPr>
+        </p:nvSpPr>
+        <p:spPr>
+          <a:xfrm>
+            <a:off x="381000" y="685800"/>
+            <a:ext cx="6096000" cy="3429000"/>
+          </a:xfrm>
+          <a:custGeom>
+            <a:avLst/>
+            <a:gdLst/>
+            <a:ahLst/>
+            <a:cxnLst/>
+            <a:rect l="l" t="t" r="r" b="b"/>
+            <a:pathLst>
+              <a:path w="120000" h="120000" extrusionOk="0">
+                <a:moveTo>
+                  <a:pt x="0" y="0"/>
+                </a:moveTo>
+                <a:lnTo>
+                  <a:pt x="120000" y="0"/>
+                </a:lnTo>
+                <a:lnTo>
+                  <a:pt x="120000" y="120000"/>
+                </a:lnTo>
+                <a:lnTo>
+                  <a:pt x="0" y="120000"/>
+                </a:lnTo>
+                <a:close/>
+              </a:path>
+            </a:pathLst>
+          </a:custGeom>
+        </p:spPr>
+      </p:sp>
+      <p:sp>
+        <p:nvSpPr>
+          <p:cNvPr id="259" name="Google Shape;259;p:notes"/>
+          <p:cNvSpPr txBox="1">
+            <a:spLocks noGrp="1"/>
+          </p:cNvSpPr>
+          <p:nvPr>
+            <p:ph type="body" idx="1"/>
+          </p:nvPr>
+        </p:nvSpPr>
+        <p:spPr>
+          <a:xfrm>
+            <a:off x="685800" y="4343400"/>
+            <a:ext cx="5486400" cy="4114800"/>
+          </a:xfrm>
+          <a:prstGeom prst="rect">
+            <a:avLst/>
+          </a:prstGeom>
+        </p:spPr>
+        <p:txBody>
+          <a:bodyPr spcFirstLastPara="1" wrap="square" lIns="91425" tIns="91425" rIns="91425" bIns="91425" anchor="t" anchorCtr="0">
+            <a:noAutofit/>
+          </a:bodyPr>
+          <a:lstStyle/>
+          <a:p>
+            <a:pPr marL="0" lvl="0" indent="0" algn="l" rtl="0">
+              <a:spcBef>
+                <a:spcPts val="0"/>
+              </a:spcBef>
+              <a:spcAft>
+                <a:spcPts val="0"/>
+              </a:spcAft>
+              <a:buNone/>
+            </a:pPr>
+            <a:endParaRPr/>
+          </a:p>
+        </p:txBody>
+      </p:sp>
+    </p:spTree>
+    <p:extLst>
+      <p:ext uri="{BB962C8B-B14F-4D97-AF65-F5344CB8AC3E}">
+        <p14:creationId xmlns:p14="http://schemas.microsoft.com/office/powerpoint/2010/main" val="4271102724"/>
+      </p:ext>
+    </p:extLst>
+  </p:cSld>
+  <p:clrMapOvr>
+    <a:masterClrMapping/>
+  </p:clrMapOvr>
+</p:notes>
+</file>
+
+<file path=ppt/notesSlides/notesSlide13.xml><?xml version="1.0" encoding="utf-8"?>
+<p:notes xmlns:a="http://schemas.openxmlformats.org/drawingml/2006/main" xmlns:r="http://schemas.openxmlformats.org/officeDocument/2006/relationships" xmlns:p="http://schemas.openxmlformats.org/presentationml/2006/main" showMasterSp="0" showMasterPhAnim="0">
+  <p:cSld>
+    <p:spTree>
+      <p:nvGrpSpPr>
         <p:cNvPr id="1" name="Shape 406"/>
         <p:cNvGrpSpPr/>
         <p:nvPr/>
@@ -949,7 +1279,7 @@
 </p:notes>
 </file>
 
-<file path=ppt/notesSlides/notesSlide11.xml><?xml version="1.0" encoding="utf-8"?>
+<file path=ppt/notesSlides/notesSlide14.xml><?xml version="1.0" encoding="utf-8"?>
 <p:notes xmlns:a="http://schemas.openxmlformats.org/drawingml/2006/main" xmlns:r="http://schemas.openxmlformats.org/officeDocument/2006/relationships" xmlns:p="http://schemas.openxmlformats.org/presentationml/2006/main" showMasterSp="0" showMasterPhAnim="0">
   <p:cSld>
     <p:spTree>
@@ -1885,7 +2215,7 @@
     </p:spTree>
     <p:extLst>
       <p:ext uri="{BB962C8B-B14F-4D97-AF65-F5344CB8AC3E}">
-        <p14:creationId xmlns:p14="http://schemas.microsoft.com/office/powerpoint/2010/main" val="4271102724"/>
+        <p14:creationId xmlns:p14="http://schemas.microsoft.com/office/powerpoint/2010/main" val="1490668514"/>
       </p:ext>
     </p:extLst>
   </p:cSld>
@@ -33014,6 +33344,649 @@
   <p:cSld>
     <p:spTree>
       <p:nvGrpSpPr>
+        <p:cNvPr id="1" name="Shape 260"/>
+        <p:cNvGrpSpPr/>
+        <p:nvPr/>
+      </p:nvGrpSpPr>
+      <p:grpSpPr>
+        <a:xfrm>
+          <a:off x="0" y="0"/>
+          <a:ext cx="0" cy="0"/>
+          <a:chOff x="0" y="0"/>
+          <a:chExt cx="0" cy="0"/>
+        </a:xfrm>
+      </p:grpSpPr>
+      <p:sp>
+        <p:nvSpPr>
+          <p:cNvPr id="261" name="Google Shape;261;p16"/>
+          <p:cNvSpPr txBox="1">
+            <a:spLocks noGrp="1"/>
+          </p:cNvSpPr>
+          <p:nvPr>
+            <p:ph type="title"/>
+          </p:nvPr>
+        </p:nvSpPr>
+        <p:spPr>
+          <a:xfrm>
+            <a:off x="350410" y="687091"/>
+            <a:ext cx="5138700" cy="857400"/>
+          </a:xfrm>
+          <a:prstGeom prst="rect">
+            <a:avLst/>
+          </a:prstGeom>
+        </p:spPr>
+        <p:txBody>
+          <a:bodyPr spcFirstLastPara="1" wrap="square" lIns="91425" tIns="91425" rIns="91425" bIns="91425" anchor="b" anchorCtr="0">
+            <a:noAutofit/>
+          </a:bodyPr>
+          <a:lstStyle/>
+          <a:p>
+            <a:pPr marL="0" lvl="0" indent="0" algn="l" rtl="0">
+              <a:spcBef>
+                <a:spcPts val="0"/>
+              </a:spcBef>
+              <a:spcAft>
+                <a:spcPts val="0"/>
+              </a:spcAft>
+              <a:buNone/>
+            </a:pPr>
+            <a:r>
+              <a:rPr lang="es-MX" dirty="0"/>
+              <a:t>Leyes del marco legal correspondiente  a nuestros servicios </a:t>
+            </a:r>
+          </a:p>
+        </p:txBody>
+      </p:sp>
+      <p:sp>
+        <p:nvSpPr>
+          <p:cNvPr id="263" name="Google Shape;263;p16"/>
+          <p:cNvSpPr txBox="1">
+            <a:spLocks noGrp="1"/>
+          </p:cNvSpPr>
+          <p:nvPr>
+            <p:ph type="sldNum" idx="12"/>
+          </p:nvPr>
+        </p:nvSpPr>
+        <p:spPr>
+          <a:xfrm>
+            <a:off x="8808000" y="2208279"/>
+            <a:ext cx="336000" cy="727200"/>
+          </a:xfrm>
+          <a:prstGeom prst="rect">
+            <a:avLst/>
+          </a:prstGeom>
+        </p:spPr>
+        <p:txBody>
+          <a:bodyPr spcFirstLastPara="1" wrap="square" lIns="91425" tIns="91425" rIns="91425" bIns="91425" anchor="ctr" anchorCtr="0">
+            <a:noAutofit/>
+          </a:bodyPr>
+          <a:lstStyle/>
+          <a:p>
+            <a:pPr marL="0" lvl="0" indent="0" algn="ctr" rtl="0">
+              <a:spcBef>
+                <a:spcPts val="0"/>
+              </a:spcBef>
+              <a:spcAft>
+                <a:spcPts val="0"/>
+              </a:spcAft>
+              <a:buNone/>
+            </a:pPr>
+            <a:fld id="{00000000-1234-1234-1234-123412341234}" type="slidenum">
+              <a:rPr lang="en"/>
+              <a:t>10</a:t>
+            </a:fld>
+            <a:endParaRPr/>
+          </a:p>
+        </p:txBody>
+      </p:sp>
+      <p:sp>
+        <p:nvSpPr>
+          <p:cNvPr id="7" name="CuadroTexto 6">
+            <a:extLst>
+              <a:ext uri="{FF2B5EF4-FFF2-40B4-BE49-F238E27FC236}">
+                <a16:creationId xmlns:a16="http://schemas.microsoft.com/office/drawing/2014/main" id="{7CC02281-3960-F87C-9DCC-C2A11D30C8B1}"/>
+              </a:ext>
+            </a:extLst>
+          </p:cNvPr>
+          <p:cNvSpPr txBox="1"/>
+          <p:nvPr/>
+        </p:nvSpPr>
+        <p:spPr>
+          <a:xfrm>
+            <a:off x="129540" y="1712131"/>
+            <a:ext cx="6042660" cy="2631490"/>
+          </a:xfrm>
+          <a:prstGeom prst="rect">
+            <a:avLst/>
+          </a:prstGeom>
+          <a:noFill/>
+        </p:spPr>
+        <p:txBody>
+          <a:bodyPr wrap="square">
+            <a:spAutoFit/>
+          </a:bodyPr>
+          <a:lstStyle/>
+          <a:p>
+            <a:r>
+              <a:rPr lang="es-MX" sz="1100" b="1" dirty="0"/>
+              <a:t>Artículo 110</a:t>
+            </a:r>
+            <a:r>
+              <a:rPr lang="es-MX" sz="1100" dirty="0"/>
+              <a:t>.- El titular del derecho patrimonial sobre una base de datos tendrá el derecho exclusivo,</a:t>
+            </a:r>
+          </a:p>
+          <a:p>
+            <a:r>
+              <a:rPr lang="es-MX" sz="1100" dirty="0"/>
+              <a:t>respecto de la forma de expresión de la estructura de dicha base, de autorizar o prohibir:</a:t>
+            </a:r>
+          </a:p>
+          <a:p>
+            <a:r>
+              <a:rPr lang="es-MX" sz="1100" dirty="0"/>
+              <a:t>I. Su reproducción permanente o temporal, total o parcial, por cualquier medio y de cualquier forma;</a:t>
+            </a:r>
+          </a:p>
+          <a:p>
+            <a:r>
+              <a:rPr lang="es-MX" sz="1100" dirty="0"/>
+              <a:t>II. Su traducción, adaptación, reordenación y cualquier otra modificación;</a:t>
+            </a:r>
+          </a:p>
+          <a:p>
+            <a:r>
+              <a:rPr lang="es-MX" sz="1100" dirty="0"/>
+              <a:t>III. La distribución del original o copias de la base de datos;</a:t>
+            </a:r>
+          </a:p>
+          <a:p>
+            <a:r>
+              <a:rPr lang="es-MX" sz="1100" dirty="0"/>
+              <a:t>IV. La comunicación al público, y</a:t>
+            </a:r>
+          </a:p>
+          <a:p>
+            <a:r>
+              <a:rPr lang="es-MX" sz="1100" dirty="0"/>
+              <a:t>V. La reproducción, distribución o comunicación pública de los resultados de las operaciones</a:t>
+            </a:r>
+          </a:p>
+          <a:p>
+            <a:r>
+              <a:rPr lang="es-MX" sz="1100" dirty="0"/>
+              <a:t>mencionadas en la fracción II del presente artículo.</a:t>
+            </a:r>
+          </a:p>
+          <a:p>
+            <a:r>
+              <a:rPr lang="es-MX" sz="1100" b="1" dirty="0"/>
+              <a:t>Artículo 111</a:t>
+            </a:r>
+            <a:r>
+              <a:rPr lang="es-MX" sz="1100" dirty="0"/>
+              <a:t>.- Los programas efectuados electrónicamente que contengan elementos visuales,</a:t>
+            </a:r>
+          </a:p>
+          <a:p>
+            <a:r>
+              <a:rPr lang="es-MX" sz="1100" dirty="0"/>
+              <a:t>sonoros, tridimensionales o animados quedan protegidos por esta Ley en los elementos primigenios que</a:t>
+            </a:r>
+          </a:p>
+          <a:p>
+            <a:r>
+              <a:rPr lang="es-MX" sz="1100" dirty="0"/>
+              <a:t>contengan.</a:t>
+            </a:r>
+          </a:p>
+        </p:txBody>
+      </p:sp>
+    </p:spTree>
+    <p:extLst>
+      <p:ext uri="{BB962C8B-B14F-4D97-AF65-F5344CB8AC3E}">
+        <p14:creationId xmlns:p14="http://schemas.microsoft.com/office/powerpoint/2010/main" val="168979628"/>
+      </p:ext>
+    </p:extLst>
+  </p:cSld>
+  <p:clrMapOvr>
+    <a:masterClrMapping/>
+  </p:clrMapOvr>
+</p:sld>
+</file>
+
+<file path=ppt/slides/slide11.xml><?xml version="1.0" encoding="utf-8"?>
+<p:sld xmlns:a="http://schemas.openxmlformats.org/drawingml/2006/main" xmlns:r="http://schemas.openxmlformats.org/officeDocument/2006/relationships" xmlns:p="http://schemas.openxmlformats.org/presentationml/2006/main">
+  <p:cSld>
+    <p:spTree>
+      <p:nvGrpSpPr>
+        <p:cNvPr id="1" name="Shape 260"/>
+        <p:cNvGrpSpPr/>
+        <p:nvPr/>
+      </p:nvGrpSpPr>
+      <p:grpSpPr>
+        <a:xfrm>
+          <a:off x="0" y="0"/>
+          <a:ext cx="0" cy="0"/>
+          <a:chOff x="0" y="0"/>
+          <a:chExt cx="0" cy="0"/>
+        </a:xfrm>
+      </p:grpSpPr>
+      <p:sp>
+        <p:nvSpPr>
+          <p:cNvPr id="261" name="Google Shape;261;p16"/>
+          <p:cNvSpPr txBox="1">
+            <a:spLocks noGrp="1"/>
+          </p:cNvSpPr>
+          <p:nvPr>
+            <p:ph type="title"/>
+          </p:nvPr>
+        </p:nvSpPr>
+        <p:spPr>
+          <a:xfrm>
+            <a:off x="350410" y="687091"/>
+            <a:ext cx="5138700" cy="857400"/>
+          </a:xfrm>
+          <a:prstGeom prst="rect">
+            <a:avLst/>
+          </a:prstGeom>
+        </p:spPr>
+        <p:txBody>
+          <a:bodyPr spcFirstLastPara="1" wrap="square" lIns="91425" tIns="91425" rIns="91425" bIns="91425" anchor="b" anchorCtr="0">
+            <a:noAutofit/>
+          </a:bodyPr>
+          <a:lstStyle/>
+          <a:p>
+            <a:pPr marL="0" lvl="0" indent="0" algn="l" rtl="0">
+              <a:spcBef>
+                <a:spcPts val="0"/>
+              </a:spcBef>
+              <a:spcAft>
+                <a:spcPts val="0"/>
+              </a:spcAft>
+              <a:buNone/>
+            </a:pPr>
+            <a:r>
+              <a:rPr lang="es-MX" dirty="0"/>
+              <a:t>Leyes del marco legal correspondiente  a nuestros servicios </a:t>
+            </a:r>
+          </a:p>
+        </p:txBody>
+      </p:sp>
+      <p:sp>
+        <p:nvSpPr>
+          <p:cNvPr id="263" name="Google Shape;263;p16"/>
+          <p:cNvSpPr txBox="1">
+            <a:spLocks noGrp="1"/>
+          </p:cNvSpPr>
+          <p:nvPr>
+            <p:ph type="sldNum" idx="12"/>
+          </p:nvPr>
+        </p:nvSpPr>
+        <p:spPr>
+          <a:xfrm>
+            <a:off x="8808000" y="2208279"/>
+            <a:ext cx="336000" cy="727200"/>
+          </a:xfrm>
+          <a:prstGeom prst="rect">
+            <a:avLst/>
+          </a:prstGeom>
+        </p:spPr>
+        <p:txBody>
+          <a:bodyPr spcFirstLastPara="1" wrap="square" lIns="91425" tIns="91425" rIns="91425" bIns="91425" anchor="ctr" anchorCtr="0">
+            <a:noAutofit/>
+          </a:bodyPr>
+          <a:lstStyle/>
+          <a:p>
+            <a:pPr marL="0" lvl="0" indent="0" algn="ctr" rtl="0">
+              <a:spcBef>
+                <a:spcPts val="0"/>
+              </a:spcBef>
+              <a:spcAft>
+                <a:spcPts val="0"/>
+              </a:spcAft>
+              <a:buNone/>
+            </a:pPr>
+            <a:fld id="{00000000-1234-1234-1234-123412341234}" type="slidenum">
+              <a:rPr lang="en"/>
+              <a:t>11</a:t>
+            </a:fld>
+            <a:endParaRPr/>
+          </a:p>
+        </p:txBody>
+      </p:sp>
+      <p:sp>
+        <p:nvSpPr>
+          <p:cNvPr id="7" name="CuadroTexto 6">
+            <a:extLst>
+              <a:ext uri="{FF2B5EF4-FFF2-40B4-BE49-F238E27FC236}">
+                <a16:creationId xmlns:a16="http://schemas.microsoft.com/office/drawing/2014/main" id="{7CC02281-3960-F87C-9DCC-C2A11D30C8B1}"/>
+              </a:ext>
+            </a:extLst>
+          </p:cNvPr>
+          <p:cNvSpPr txBox="1"/>
+          <p:nvPr/>
+        </p:nvSpPr>
+        <p:spPr>
+          <a:xfrm>
+            <a:off x="53340" y="1840739"/>
+            <a:ext cx="6042660" cy="2462213"/>
+          </a:xfrm>
+          <a:prstGeom prst="rect">
+            <a:avLst/>
+          </a:prstGeom>
+          <a:noFill/>
+        </p:spPr>
+        <p:txBody>
+          <a:bodyPr wrap="square">
+            <a:spAutoFit/>
+          </a:bodyPr>
+          <a:lstStyle/>
+          <a:p>
+            <a:pPr algn="just"/>
+            <a:r>
+              <a:rPr lang="es-MX" sz="1100" dirty="0"/>
+              <a:t>En cuanto a la Revelación de Secretos y</a:t>
+            </a:r>
+          </a:p>
+          <a:p>
+            <a:pPr algn="just"/>
+            <a:r>
+              <a:rPr lang="es-MX" sz="1100" dirty="0"/>
+              <a:t>Acceso Ilícito a Sistemas y Equipos de Informática.</a:t>
+            </a:r>
+          </a:p>
+          <a:p>
+            <a:pPr algn="just"/>
+            <a:endParaRPr lang="es-MX" sz="1100" dirty="0"/>
+          </a:p>
+          <a:p>
+            <a:pPr algn="just"/>
+            <a:r>
+              <a:rPr lang="es-MX" sz="1100" dirty="0"/>
+              <a:t>– Al que sin autorización modifique, destruya o provoque pérdida de información contenida en sistemas o equipos de informática protegidos por algún mecanismo de seguridad.</a:t>
+            </a:r>
+          </a:p>
+          <a:p>
+            <a:pPr algn="just"/>
+            <a:r>
+              <a:rPr lang="es-MX" sz="1100" dirty="0"/>
+              <a:t>– Al que sin autorización conozca o copie información contenida en sistemas o equipos de informática del Estado, protegidos por algún mecanismo de seguridad.</a:t>
+            </a:r>
+          </a:p>
+          <a:p>
+            <a:pPr algn="just"/>
+            <a:r>
+              <a:rPr lang="es-MX" sz="1100" dirty="0"/>
+              <a:t>– Al que estando autorizado para acceder a sistemas y equipos de informática del Estado, indebidamente modifique, destruya o provoque pérdida de información que contengan.</a:t>
+            </a:r>
+          </a:p>
+          <a:p>
+            <a:pPr algn="just"/>
+            <a:r>
+              <a:rPr lang="es-MX" sz="1100" dirty="0"/>
+              <a:t>– Al que estando autorizado para acceder a sistemas y equipos de informática del estado, indebidamente copie información que contengan.</a:t>
+            </a:r>
+          </a:p>
+          <a:p>
+            <a:pPr algn="just"/>
+            <a:r>
+              <a:rPr lang="es-MX" sz="1100" dirty="0"/>
+              <a:t>– Al que sin autorización modifique, destruya o =provoque pérdida de información contenida en sistemas o equipos de informática de las instituciones que integran el sistema financiero, protegidos por algún mecanismo de seguridad.</a:t>
+            </a:r>
+          </a:p>
+        </p:txBody>
+      </p:sp>
+    </p:spTree>
+    <p:extLst>
+      <p:ext uri="{BB962C8B-B14F-4D97-AF65-F5344CB8AC3E}">
+        <p14:creationId xmlns:p14="http://schemas.microsoft.com/office/powerpoint/2010/main" val="2039365911"/>
+      </p:ext>
+    </p:extLst>
+  </p:cSld>
+  <p:clrMapOvr>
+    <a:masterClrMapping/>
+  </p:clrMapOvr>
+</p:sld>
+</file>
+
+<file path=ppt/slides/slide12.xml><?xml version="1.0" encoding="utf-8"?>
+<p:sld xmlns:a="http://schemas.openxmlformats.org/drawingml/2006/main" xmlns:r="http://schemas.openxmlformats.org/officeDocument/2006/relationships" xmlns:p="http://schemas.openxmlformats.org/presentationml/2006/main">
+  <p:cSld>
+    <p:spTree>
+      <p:nvGrpSpPr>
+        <p:cNvPr id="1" name="Shape 260"/>
+        <p:cNvGrpSpPr/>
+        <p:nvPr/>
+      </p:nvGrpSpPr>
+      <p:grpSpPr>
+        <a:xfrm>
+          <a:off x="0" y="0"/>
+          <a:ext cx="0" cy="0"/>
+          <a:chOff x="0" y="0"/>
+          <a:chExt cx="0" cy="0"/>
+        </a:xfrm>
+      </p:grpSpPr>
+      <p:sp>
+        <p:nvSpPr>
+          <p:cNvPr id="261" name="Google Shape;261;p16"/>
+          <p:cNvSpPr txBox="1">
+            <a:spLocks noGrp="1"/>
+          </p:cNvSpPr>
+          <p:nvPr>
+            <p:ph type="title"/>
+          </p:nvPr>
+        </p:nvSpPr>
+        <p:spPr>
+          <a:xfrm>
+            <a:off x="403805" y="93065"/>
+            <a:ext cx="5138700" cy="857400"/>
+          </a:xfrm>
+          <a:prstGeom prst="rect">
+            <a:avLst/>
+          </a:prstGeom>
+        </p:spPr>
+        <p:txBody>
+          <a:bodyPr spcFirstLastPara="1" wrap="square" lIns="91425" tIns="91425" rIns="91425" bIns="91425" anchor="b" anchorCtr="0">
+            <a:noAutofit/>
+          </a:bodyPr>
+          <a:lstStyle/>
+          <a:p>
+            <a:pPr marL="0" lvl="0" indent="0" algn="l" rtl="0">
+              <a:spcBef>
+                <a:spcPts val="0"/>
+              </a:spcBef>
+              <a:spcAft>
+                <a:spcPts val="0"/>
+              </a:spcAft>
+              <a:buNone/>
+            </a:pPr>
+            <a:r>
+              <a:rPr lang="es-MX"/>
+              <a:t>Tipos de contrato</a:t>
+            </a:r>
+          </a:p>
+        </p:txBody>
+      </p:sp>
+      <p:sp>
+        <p:nvSpPr>
+          <p:cNvPr id="262" name="Google Shape;262;p16"/>
+          <p:cNvSpPr txBox="1">
+            <a:spLocks noGrp="1"/>
+          </p:cNvSpPr>
+          <p:nvPr>
+            <p:ph type="body" idx="1"/>
+          </p:nvPr>
+        </p:nvSpPr>
+        <p:spPr>
+          <a:xfrm>
+            <a:off x="225846" y="1429138"/>
+            <a:ext cx="5138700" cy="1506341"/>
+          </a:xfrm>
+          <a:prstGeom prst="rect">
+            <a:avLst/>
+          </a:prstGeom>
+        </p:spPr>
+        <p:txBody>
+          <a:bodyPr spcFirstLastPara="1" wrap="square" lIns="91425" tIns="91425" rIns="91425" bIns="91425" anchor="t" anchorCtr="0">
+            <a:noAutofit/>
+          </a:bodyPr>
+          <a:lstStyle/>
+          <a:p>
+            <a:pPr marL="457200" lvl="0" indent="-381000" algn="l" rtl="0">
+              <a:spcBef>
+                <a:spcPts val="600"/>
+              </a:spcBef>
+              <a:spcAft>
+                <a:spcPts val="0"/>
+              </a:spcAft>
+              <a:buSzPts val="2400"/>
+              <a:buChar char="▹"/>
+            </a:pPr>
+            <a:r>
+              <a:rPr lang="es-MX"/>
+              <a:t>Contrato a termino fijo </a:t>
+            </a:r>
+          </a:p>
+          <a:p>
+            <a:pPr marL="457200" lvl="0" indent="-381000" algn="l" rtl="0">
+              <a:spcBef>
+                <a:spcPts val="600"/>
+              </a:spcBef>
+              <a:spcAft>
+                <a:spcPts val="0"/>
+              </a:spcAft>
+              <a:buSzPts val="2400"/>
+              <a:buChar char="▹"/>
+            </a:pPr>
+            <a:r>
+              <a:rPr lang="es-MX"/>
+              <a:t>Contrato a termino indefinido</a:t>
+            </a:r>
+          </a:p>
+          <a:p>
+            <a:pPr marL="457200" lvl="0" indent="-381000" algn="l" rtl="0">
+              <a:spcBef>
+                <a:spcPts val="600"/>
+              </a:spcBef>
+              <a:spcAft>
+                <a:spcPts val="0"/>
+              </a:spcAft>
+              <a:buSzPts val="2400"/>
+              <a:buChar char="▹"/>
+            </a:pPr>
+            <a:r>
+              <a:rPr lang="es-MX"/>
+              <a:t>Contratacion civil por prestacion de servicios</a:t>
+            </a:r>
+          </a:p>
+          <a:p>
+            <a:pPr marL="457200" lvl="0" indent="-381000" algn="l" rtl="0">
+              <a:spcBef>
+                <a:spcPts val="600"/>
+              </a:spcBef>
+              <a:spcAft>
+                <a:spcPts val="0"/>
+              </a:spcAft>
+              <a:buSzPts val="2400"/>
+              <a:buChar char="▹"/>
+            </a:pPr>
+            <a:r>
+              <a:rPr lang="es-MX"/>
+              <a:t>Contratacion por servicios</a:t>
+            </a:r>
+          </a:p>
+          <a:p>
+            <a:pPr marL="457200" lvl="0" indent="-381000" algn="l" rtl="0">
+              <a:spcBef>
+                <a:spcPts val="600"/>
+              </a:spcBef>
+              <a:spcAft>
+                <a:spcPts val="0"/>
+              </a:spcAft>
+              <a:buSzPts val="2400"/>
+              <a:buChar char="▹"/>
+            </a:pPr>
+            <a:r>
+              <a:rPr lang="es-MX"/>
+              <a:t>Contrato por asesorias</a:t>
+            </a:r>
+          </a:p>
+          <a:p>
+            <a:pPr marL="457200" lvl="0" indent="-381000" algn="l" rtl="0">
+              <a:spcBef>
+                <a:spcPts val="600"/>
+              </a:spcBef>
+              <a:spcAft>
+                <a:spcPts val="0"/>
+              </a:spcAft>
+              <a:buSzPts val="2400"/>
+              <a:buChar char="▹"/>
+            </a:pPr>
+            <a:endParaRPr lang="es-MX"/>
+          </a:p>
+        </p:txBody>
+      </p:sp>
+      <p:sp>
+        <p:nvSpPr>
+          <p:cNvPr id="263" name="Google Shape;263;p16"/>
+          <p:cNvSpPr txBox="1">
+            <a:spLocks noGrp="1"/>
+          </p:cNvSpPr>
+          <p:nvPr>
+            <p:ph type="sldNum" idx="12"/>
+          </p:nvPr>
+        </p:nvSpPr>
+        <p:spPr>
+          <a:xfrm>
+            <a:off x="8808000" y="2208279"/>
+            <a:ext cx="336000" cy="727200"/>
+          </a:xfrm>
+          <a:prstGeom prst="rect">
+            <a:avLst/>
+          </a:prstGeom>
+        </p:spPr>
+        <p:txBody>
+          <a:bodyPr spcFirstLastPara="1" wrap="square" lIns="91425" tIns="91425" rIns="91425" bIns="91425" anchor="ctr" anchorCtr="0">
+            <a:noAutofit/>
+          </a:bodyPr>
+          <a:lstStyle/>
+          <a:p>
+            <a:pPr marL="0" lvl="0" indent="0" algn="ctr" rtl="0">
+              <a:spcBef>
+                <a:spcPts val="0"/>
+              </a:spcBef>
+              <a:spcAft>
+                <a:spcPts val="0"/>
+              </a:spcAft>
+              <a:buNone/>
+            </a:pPr>
+            <a:fld id="{00000000-1234-1234-1234-123412341234}" type="slidenum">
+              <a:rPr lang="en"/>
+              <a:t>12</a:t>
+            </a:fld>
+            <a:endParaRPr/>
+          </a:p>
+        </p:txBody>
+      </p:sp>
+    </p:spTree>
+    <p:extLst>
+      <p:ext uri="{BB962C8B-B14F-4D97-AF65-F5344CB8AC3E}">
+        <p14:creationId xmlns:p14="http://schemas.microsoft.com/office/powerpoint/2010/main" val="1866388024"/>
+      </p:ext>
+    </p:extLst>
+  </p:cSld>
+  <p:clrMapOvr>
+    <a:masterClrMapping/>
+  </p:clrMapOvr>
+</p:sld>
+</file>
+
+<file path=ppt/slides/slide13.xml><?xml version="1.0" encoding="utf-8"?>
+<p:sld xmlns:a="http://schemas.openxmlformats.org/drawingml/2006/main" xmlns:r="http://schemas.openxmlformats.org/officeDocument/2006/relationships" xmlns:p="http://schemas.openxmlformats.org/presentationml/2006/main">
+  <p:cSld>
+    <p:spTree>
+      <p:nvGrpSpPr>
         <p:cNvPr id="1" name="Shape 409"/>
         <p:cNvGrpSpPr/>
         <p:nvPr/>
@@ -33103,7 +34076,7 @@
             </a:pPr>
             <a:fld id="{00000000-1234-1234-1234-123412341234}" type="slidenum">
               <a:rPr lang="en"/>
-              <a:t>10</a:t>
+              <a:t>13</a:t>
             </a:fld>
             <a:endParaRPr dirty="0"/>
           </a:p>
@@ -34630,7 +35603,7 @@
 </p:sld>
 </file>
 
-<file path=ppt/slides/slide11.xml><?xml version="1.0" encoding="utf-8"?>
+<file path=ppt/slides/slide14.xml><?xml version="1.0" encoding="utf-8"?>
 <p:sld xmlns:a="http://schemas.openxmlformats.org/drawingml/2006/main" xmlns:r="http://schemas.openxmlformats.org/officeDocument/2006/relationships" xmlns:p="http://schemas.openxmlformats.org/presentationml/2006/main">
   <p:cSld>
     <p:spTree>
@@ -34707,7 +35680,7 @@
             </a:pPr>
             <a:fld id="{00000000-1234-1234-1234-123412341234}" type="slidenum">
               <a:rPr lang="es-MX" smtClean="0"/>
-              <a:t>11</a:t>
+              <a:t>14</a:t>
             </a:fld>
             <a:endParaRPr lang="es-MX" dirty="0"/>
           </a:p>
@@ -34769,7 +35742,7 @@
 </p:sld>
 </file>
 
-<file path=ppt/slides/slide12.xml><?xml version="1.0" encoding="utf-8"?>
+<file path=ppt/slides/slide15.xml><?xml version="1.0" encoding="utf-8"?>
 <p:sld xmlns:a="http://schemas.openxmlformats.org/drawingml/2006/main" xmlns:r="http://schemas.openxmlformats.org/officeDocument/2006/relationships" xmlns:p="http://schemas.openxmlformats.org/presentationml/2006/main">
   <p:cSld>
     <p:spTree>
@@ -34822,7 +35795,7 @@
             </a:pPr>
             <a:fld id="{00000000-1234-1234-1234-123412341234}" type="slidenum">
               <a:rPr lang="en"/>
-              <a:t>12</a:t>
+              <a:t>15</a:t>
             </a:fld>
             <a:endParaRPr/>
           </a:p>
@@ -49473,7 +50446,7 @@
         </p:nvSpPr>
         <p:spPr>
           <a:xfrm>
-            <a:off x="403805" y="93065"/>
+            <a:off x="350410" y="687091"/>
             <a:ext cx="5138700" cy="857400"/>
           </a:xfrm>
           <a:prstGeom prst="rect">
@@ -49496,128 +50469,9 @@
               <a:buNone/>
             </a:pPr>
             <a:r>
-              <a:rPr lang="es-MX"/>
-              <a:t>Tipos de contrato</a:t>
+              <a:rPr lang="es-MX" dirty="0"/>
+              <a:t>Leyes del marco legal correspondiente  a nuestros servicios </a:t>
             </a:r>
-          </a:p>
-        </p:txBody>
-      </p:sp>
-      <p:sp>
-        <p:nvSpPr>
-          <p:cNvPr id="262" name="Google Shape;262;p16"/>
-          <p:cNvSpPr txBox="1">
-            <a:spLocks noGrp="1"/>
-          </p:cNvSpPr>
-          <p:nvPr>
-            <p:ph type="body" idx="1"/>
-          </p:nvPr>
-        </p:nvSpPr>
-        <p:spPr>
-          <a:xfrm>
-            <a:off x="225846" y="1429138"/>
-            <a:ext cx="5138700" cy="1506341"/>
-          </a:xfrm>
-          <a:prstGeom prst="rect">
-            <a:avLst/>
-          </a:prstGeom>
-        </p:spPr>
-        <p:txBody>
-          <a:bodyPr spcFirstLastPara="1" wrap="square" lIns="91425" tIns="91425" rIns="91425" bIns="91425" anchor="t" anchorCtr="0">
-            <a:noAutofit/>
-          </a:bodyPr>
-          <a:lstStyle/>
-          <a:p>
-            <a:pPr marL="457200" lvl="0" indent="-381000" algn="l" rtl="0">
-              <a:spcBef>
-                <a:spcPts val="600"/>
-              </a:spcBef>
-              <a:spcAft>
-                <a:spcPts val="0"/>
-              </a:spcAft>
-              <a:buSzPts val="2400"/>
-              <a:buChar char="▹"/>
-            </a:pPr>
-            <a:r>
-              <a:rPr lang="es-MX"/>
-              <a:t>Contrato a termino fijo </a:t>
-            </a:r>
-          </a:p>
-          <a:p>
-            <a:pPr marL="457200" lvl="0" indent="-381000" algn="l" rtl="0">
-              <a:spcBef>
-                <a:spcPts val="600"/>
-              </a:spcBef>
-              <a:spcAft>
-                <a:spcPts val="0"/>
-              </a:spcAft>
-              <a:buSzPts val="2400"/>
-              <a:buChar char="▹"/>
-            </a:pPr>
-            <a:r>
-              <a:rPr lang="es-MX"/>
-              <a:t>Contrato a termino indefinido</a:t>
-            </a:r>
-          </a:p>
-          <a:p>
-            <a:pPr marL="457200" lvl="0" indent="-381000" algn="l" rtl="0">
-              <a:spcBef>
-                <a:spcPts val="600"/>
-              </a:spcBef>
-              <a:spcAft>
-                <a:spcPts val="0"/>
-              </a:spcAft>
-              <a:buSzPts val="2400"/>
-              <a:buChar char="▹"/>
-            </a:pPr>
-            <a:r>
-              <a:rPr lang="es-MX"/>
-              <a:t>Contratacion civil por prestacion de servicios</a:t>
-            </a:r>
-          </a:p>
-          <a:p>
-            <a:pPr marL="457200" lvl="0" indent="-381000" algn="l" rtl="0">
-              <a:spcBef>
-                <a:spcPts val="600"/>
-              </a:spcBef>
-              <a:spcAft>
-                <a:spcPts val="0"/>
-              </a:spcAft>
-              <a:buSzPts val="2400"/>
-              <a:buChar char="▹"/>
-            </a:pPr>
-            <a:r>
-              <a:rPr lang="es-MX"/>
-              <a:t>Contratacion por servicios</a:t>
-            </a:r>
-          </a:p>
-          <a:p>
-            <a:pPr marL="457200" lvl="0" indent="-381000" algn="l" rtl="0">
-              <a:spcBef>
-                <a:spcPts val="600"/>
-              </a:spcBef>
-              <a:spcAft>
-                <a:spcPts val="0"/>
-              </a:spcAft>
-              <a:buSzPts val="2400"/>
-              <a:buChar char="▹"/>
-            </a:pPr>
-            <a:r>
-              <a:rPr lang="es-MX"/>
-              <a:t>Contrato por asesorias</a:t>
-            </a:r>
-          </a:p>
-          <a:p>
-            <a:pPr marL="457200" lvl="0" indent="-381000" algn="l" rtl="0">
-              <a:spcBef>
-                <a:spcPts val="600"/>
-              </a:spcBef>
-              <a:spcAft>
-                <a:spcPts val="0"/>
-              </a:spcAft>
-              <a:buSzPts val="2400"/>
-              <a:buChar char="▹"/>
-            </a:pPr>
-            <a:endParaRPr lang="es-MX"/>
           </a:p>
         </p:txBody>
       </p:sp>
@@ -49663,10 +50517,111 @@
           </a:p>
         </p:txBody>
       </p:sp>
+      <p:sp>
+        <p:nvSpPr>
+          <p:cNvPr id="7" name="CuadroTexto 6">
+            <a:extLst>
+              <a:ext uri="{FF2B5EF4-FFF2-40B4-BE49-F238E27FC236}">
+                <a16:creationId xmlns:a16="http://schemas.microsoft.com/office/drawing/2014/main" id="{7CC02281-3960-F87C-9DCC-C2A11D30C8B1}"/>
+              </a:ext>
+            </a:extLst>
+          </p:cNvPr>
+          <p:cNvSpPr txBox="1"/>
+          <p:nvPr/>
+        </p:nvSpPr>
+        <p:spPr>
+          <a:xfrm>
+            <a:off x="129540" y="1712131"/>
+            <a:ext cx="6042660" cy="2970044"/>
+          </a:xfrm>
+          <a:prstGeom prst="rect">
+            <a:avLst/>
+          </a:prstGeom>
+          <a:noFill/>
+        </p:spPr>
+        <p:txBody>
+          <a:bodyPr wrap="square">
+            <a:spAutoFit/>
+          </a:bodyPr>
+          <a:lstStyle/>
+          <a:p>
+            <a:r>
+              <a:rPr lang="es-MX" sz="1100" b="1" dirty="0"/>
+              <a:t>Artículo 107</a:t>
+            </a:r>
+            <a:r>
+              <a:rPr lang="es-MX" sz="1100" dirty="0"/>
+              <a:t>.- Las bases de datos o de otros materiales legibles por medio de máquinas o en otra</a:t>
+            </a:r>
+          </a:p>
+          <a:p>
+            <a:r>
+              <a:rPr lang="es-MX" sz="1100" dirty="0"/>
+              <a:t>forma, que por razones de selección y disposición de su contenido constituyan creaciones intelectuales,</a:t>
+            </a:r>
+          </a:p>
+          <a:p>
+            <a:r>
+              <a:rPr lang="es-MX" sz="1100" dirty="0"/>
+              <a:t>quedarán protegidas como compilaciones. Dicha protección no se extenderá a los datos y materiales en sí</a:t>
+            </a:r>
+          </a:p>
+          <a:p>
+            <a:r>
+              <a:rPr lang="es-MX" sz="1100" dirty="0"/>
+              <a:t>mismos.</a:t>
+            </a:r>
+          </a:p>
+          <a:p>
+            <a:r>
+              <a:rPr lang="es-MX" sz="1100" b="1" dirty="0"/>
+              <a:t>Artículo 108</a:t>
+            </a:r>
+            <a:r>
+              <a:rPr lang="es-MX" sz="1100" dirty="0"/>
+              <a:t>.- Las bases de datos que no sean originales quedan, sin embargo, protegidas en su uso</a:t>
+            </a:r>
+          </a:p>
+          <a:p>
+            <a:r>
+              <a:rPr lang="es-MX" sz="1100" dirty="0"/>
+              <a:t>exclusivo por quien las haya elaborado, durante un lapso de 5 años.</a:t>
+            </a:r>
+          </a:p>
+          <a:p>
+            <a:r>
+              <a:rPr lang="es-MX" sz="1100" b="1" dirty="0"/>
+              <a:t>Artículo 109</a:t>
+            </a:r>
+            <a:r>
+              <a:rPr lang="es-MX" sz="1100" dirty="0"/>
+              <a:t>.- El acceso a información de carácter privado relativa a las personas contenida en las</a:t>
+            </a:r>
+          </a:p>
+          <a:p>
+            <a:r>
+              <a:rPr lang="es-MX" sz="1100" dirty="0"/>
+              <a:t>bases de datos a que se refiere el artículo anterior, así como la publicación, reproducción, divulgación,</a:t>
+            </a:r>
+          </a:p>
+          <a:p>
+            <a:r>
+              <a:rPr lang="es-MX" sz="1100" dirty="0"/>
+              <a:t>comunicación pública y transmisión de dicha información, requerirá la autorización previa de las personas</a:t>
+            </a:r>
+          </a:p>
+          <a:p>
+            <a:r>
+              <a:rPr lang="es-MX" sz="1100" dirty="0"/>
+              <a:t>de que se trate.</a:t>
+            </a:r>
+          </a:p>
+        </p:txBody>
+      </p:sp>
     </p:spTree>
     <p:extLst>
       <p:ext uri="{BB962C8B-B14F-4D97-AF65-F5344CB8AC3E}">
-        <p14:creationId xmlns:p14="http://schemas.microsoft.com/office/powerpoint/2010/main" val="1866388024"/>
+        <p14:creationId xmlns:p14="http://schemas.microsoft.com/office/powerpoint/2010/main" val="3794232010"/>
       </p:ext>
     </p:extLst>
   </p:cSld>

</xml_diff>